<commit_message>
uploaded the intern assignment and readme.
</commit_message>
<xml_diff>
--- a/doc/deisgnDoc.pptx
+++ b/doc/deisgnDoc.pptx
@@ -4,10 +4,14 @@
   <p:sldMasterIdLst>
     <p:sldMasterId id="2147483648" r:id="rId1"/>
   </p:sldMasterIdLst>
+  <p:notesMasterIdLst>
+    <p:notesMasterId r:id="rId6"/>
+  </p:notesMasterIdLst>
   <p:sldIdLst>
     <p:sldId id="257" r:id="rId2"/>
-    <p:sldId id="258" r:id="rId3"/>
-    <p:sldId id="256" r:id="rId4"/>
+    <p:sldId id="259" r:id="rId3"/>
+    <p:sldId id="258" r:id="rId4"/>
+    <p:sldId id="256" r:id="rId5"/>
   </p:sldIdLst>
   <p:sldSz cx="12192000" cy="6858000"/>
   <p:notesSz cx="6858000" cy="9144000"/>
@@ -114,6 +118,440 @@
 </p:presentation>
 </file>
 
+<file path=ppt/notesMasters/notesMaster1.xml><?xml version="1.0" encoding="utf-8"?>
+<p:notesMaster xmlns:a="http://schemas.openxmlformats.org/drawingml/2006/main" xmlns:r="http://schemas.openxmlformats.org/officeDocument/2006/relationships" xmlns:p="http://schemas.openxmlformats.org/presentationml/2006/main">
+  <p:cSld>
+    <p:bg>
+      <p:bgRef idx="1001">
+        <a:schemeClr val="bg1"/>
+      </p:bgRef>
+    </p:bg>
+    <p:spTree>
+      <p:nvGrpSpPr>
+        <p:cNvPr id="1" name=""/>
+        <p:cNvGrpSpPr/>
+        <p:nvPr/>
+      </p:nvGrpSpPr>
+      <p:grpSpPr>
+        <a:xfrm>
+          <a:off x="0" y="0"/>
+          <a:ext cx="0" cy="0"/>
+          <a:chOff x="0" y="0"/>
+          <a:chExt cx="0" cy="0"/>
+        </a:xfrm>
+      </p:grpSpPr>
+      <p:sp>
+        <p:nvSpPr>
+          <p:cNvPr id="2" name="Header Placeholder 1"/>
+          <p:cNvSpPr>
+            <a:spLocks noGrp="1"/>
+          </p:cNvSpPr>
+          <p:nvPr>
+            <p:ph type="hdr" sz="quarter"/>
+          </p:nvPr>
+        </p:nvSpPr>
+        <p:spPr>
+          <a:xfrm>
+            <a:off x="0" y="0"/>
+            <a:ext cx="2971800" cy="458788"/>
+          </a:xfrm>
+          <a:prstGeom prst="rect">
+            <a:avLst/>
+          </a:prstGeom>
+        </p:spPr>
+        <p:txBody>
+          <a:bodyPr vert="horz" lIns="91440" tIns="45720" rIns="91440" bIns="45720" rtlCol="0"/>
+          <a:lstStyle>
+            <a:lvl1pPr algn="l">
+              <a:defRPr sz="1200"/>
+            </a:lvl1pPr>
+          </a:lstStyle>
+          <a:p>
+            <a:endParaRPr lang="en-SG"/>
+          </a:p>
+        </p:txBody>
+      </p:sp>
+      <p:sp>
+        <p:nvSpPr>
+          <p:cNvPr id="3" name="Date Placeholder 2"/>
+          <p:cNvSpPr>
+            <a:spLocks noGrp="1"/>
+          </p:cNvSpPr>
+          <p:nvPr>
+            <p:ph type="dt" idx="1"/>
+          </p:nvPr>
+        </p:nvSpPr>
+        <p:spPr>
+          <a:xfrm>
+            <a:off x="3884613" y="0"/>
+            <a:ext cx="2971800" cy="458788"/>
+          </a:xfrm>
+          <a:prstGeom prst="rect">
+            <a:avLst/>
+          </a:prstGeom>
+        </p:spPr>
+        <p:txBody>
+          <a:bodyPr vert="horz" lIns="91440" tIns="45720" rIns="91440" bIns="45720" rtlCol="0"/>
+          <a:lstStyle>
+            <a:lvl1pPr algn="r">
+              <a:defRPr sz="1200"/>
+            </a:lvl1pPr>
+          </a:lstStyle>
+          <a:p>
+            <a:fld id="{39142805-F5E5-4AA9-A54C-28B797A7C2AF}" type="datetimeFigureOut">
+              <a:rPr lang="en-SG" smtClean="0"/>
+              <a:t>8/5/2022</a:t>
+            </a:fld>
+            <a:endParaRPr lang="en-SG"/>
+          </a:p>
+        </p:txBody>
+      </p:sp>
+      <p:sp>
+        <p:nvSpPr>
+          <p:cNvPr id="4" name="Slide Image Placeholder 3"/>
+          <p:cNvSpPr>
+            <a:spLocks noGrp="1" noRot="1" noChangeAspect="1"/>
+          </p:cNvSpPr>
+          <p:nvPr>
+            <p:ph type="sldImg" idx="2"/>
+          </p:nvPr>
+        </p:nvSpPr>
+        <p:spPr>
+          <a:xfrm>
+            <a:off x="685800" y="1143000"/>
+            <a:ext cx="5486400" cy="3086100"/>
+          </a:xfrm>
+          <a:prstGeom prst="rect">
+            <a:avLst/>
+          </a:prstGeom>
+          <a:noFill/>
+          <a:ln w="12700">
+            <a:solidFill>
+              <a:prstClr val="black"/>
+            </a:solidFill>
+          </a:ln>
+        </p:spPr>
+        <p:txBody>
+          <a:bodyPr vert="horz" lIns="91440" tIns="45720" rIns="91440" bIns="45720" rtlCol="0" anchor="ctr"/>
+          <a:lstStyle/>
+          <a:p>
+            <a:endParaRPr lang="en-SG"/>
+          </a:p>
+        </p:txBody>
+      </p:sp>
+      <p:sp>
+        <p:nvSpPr>
+          <p:cNvPr id="5" name="Notes Placeholder 4"/>
+          <p:cNvSpPr>
+            <a:spLocks noGrp="1"/>
+          </p:cNvSpPr>
+          <p:nvPr>
+            <p:ph type="body" sz="quarter" idx="3"/>
+          </p:nvPr>
+        </p:nvSpPr>
+        <p:spPr>
+          <a:xfrm>
+            <a:off x="685800" y="4400550"/>
+            <a:ext cx="5486400" cy="3600450"/>
+          </a:xfrm>
+          <a:prstGeom prst="rect">
+            <a:avLst/>
+          </a:prstGeom>
+        </p:spPr>
+        <p:txBody>
+          <a:bodyPr vert="horz" lIns="91440" tIns="45720" rIns="91440" bIns="45720" rtlCol="0"/>
+          <a:lstStyle/>
+          <a:p>
+            <a:pPr lvl="0"/>
+            <a:r>
+              <a:rPr lang="en-US"/>
+              <a:t>Click to edit Master text styles</a:t>
+            </a:r>
+          </a:p>
+          <a:p>
+            <a:pPr lvl="1"/>
+            <a:r>
+              <a:rPr lang="en-US"/>
+              <a:t>Second level</a:t>
+            </a:r>
+          </a:p>
+          <a:p>
+            <a:pPr lvl="2"/>
+            <a:r>
+              <a:rPr lang="en-US"/>
+              <a:t>Third level</a:t>
+            </a:r>
+          </a:p>
+          <a:p>
+            <a:pPr lvl="3"/>
+            <a:r>
+              <a:rPr lang="en-US"/>
+              <a:t>Fourth level</a:t>
+            </a:r>
+          </a:p>
+          <a:p>
+            <a:pPr lvl="4"/>
+            <a:r>
+              <a:rPr lang="en-US"/>
+              <a:t>Fifth level</a:t>
+            </a:r>
+            <a:endParaRPr lang="en-SG"/>
+          </a:p>
+        </p:txBody>
+      </p:sp>
+      <p:sp>
+        <p:nvSpPr>
+          <p:cNvPr id="6" name="Footer Placeholder 5"/>
+          <p:cNvSpPr>
+            <a:spLocks noGrp="1"/>
+          </p:cNvSpPr>
+          <p:nvPr>
+            <p:ph type="ftr" sz="quarter" idx="4"/>
+          </p:nvPr>
+        </p:nvSpPr>
+        <p:spPr>
+          <a:xfrm>
+            <a:off x="0" y="8685213"/>
+            <a:ext cx="2971800" cy="458787"/>
+          </a:xfrm>
+          <a:prstGeom prst="rect">
+            <a:avLst/>
+          </a:prstGeom>
+        </p:spPr>
+        <p:txBody>
+          <a:bodyPr vert="horz" lIns="91440" tIns="45720" rIns="91440" bIns="45720" rtlCol="0" anchor="b"/>
+          <a:lstStyle>
+            <a:lvl1pPr algn="l">
+              <a:defRPr sz="1200"/>
+            </a:lvl1pPr>
+          </a:lstStyle>
+          <a:p>
+            <a:endParaRPr lang="en-SG"/>
+          </a:p>
+        </p:txBody>
+      </p:sp>
+      <p:sp>
+        <p:nvSpPr>
+          <p:cNvPr id="7" name="Slide Number Placeholder 6"/>
+          <p:cNvSpPr>
+            <a:spLocks noGrp="1"/>
+          </p:cNvSpPr>
+          <p:nvPr>
+            <p:ph type="sldNum" sz="quarter" idx="5"/>
+          </p:nvPr>
+        </p:nvSpPr>
+        <p:spPr>
+          <a:xfrm>
+            <a:off x="3884613" y="8685213"/>
+            <a:ext cx="2971800" cy="458787"/>
+          </a:xfrm>
+          <a:prstGeom prst="rect">
+            <a:avLst/>
+          </a:prstGeom>
+        </p:spPr>
+        <p:txBody>
+          <a:bodyPr vert="horz" lIns="91440" tIns="45720" rIns="91440" bIns="45720" rtlCol="0" anchor="b"/>
+          <a:lstStyle>
+            <a:lvl1pPr algn="r">
+              <a:defRPr sz="1200"/>
+            </a:lvl1pPr>
+          </a:lstStyle>
+          <a:p>
+            <a:fld id="{49E40564-0516-41C4-A22F-3776F1418CF7}" type="slidenum">
+              <a:rPr lang="en-SG" smtClean="0"/>
+              <a:t>‹#›</a:t>
+            </a:fld>
+            <a:endParaRPr lang="en-SG"/>
+          </a:p>
+        </p:txBody>
+      </p:sp>
+    </p:spTree>
+    <p:extLst>
+      <p:ext uri="{BB962C8B-B14F-4D97-AF65-F5344CB8AC3E}">
+        <p14:creationId xmlns:p14="http://schemas.microsoft.com/office/powerpoint/2010/main" val="3908128667"/>
+      </p:ext>
+    </p:extLst>
+  </p:cSld>
+  <p:clrMap bg1="lt1" tx1="dk1" bg2="lt2" tx2="dk2" accent1="accent1" accent2="accent2" accent3="accent3" accent4="accent4" accent5="accent5" accent6="accent6" hlink="hlink" folHlink="folHlink"/>
+  <p:notesStyle>
+    <a:lvl1pPr marL="0" algn="l" defTabSz="914400" rtl="0" eaLnBrk="1" latinLnBrk="0" hangingPunct="1">
+      <a:defRPr sz="1200" kern="1200">
+        <a:solidFill>
+          <a:schemeClr val="tx1"/>
+        </a:solidFill>
+        <a:latin typeface="+mn-lt"/>
+        <a:ea typeface="+mn-ea"/>
+        <a:cs typeface="+mn-cs"/>
+      </a:defRPr>
+    </a:lvl1pPr>
+    <a:lvl2pPr marL="457200" algn="l" defTabSz="914400" rtl="0" eaLnBrk="1" latinLnBrk="0" hangingPunct="1">
+      <a:defRPr sz="1200" kern="1200">
+        <a:solidFill>
+          <a:schemeClr val="tx1"/>
+        </a:solidFill>
+        <a:latin typeface="+mn-lt"/>
+        <a:ea typeface="+mn-ea"/>
+        <a:cs typeface="+mn-cs"/>
+      </a:defRPr>
+    </a:lvl2pPr>
+    <a:lvl3pPr marL="914400" algn="l" defTabSz="914400" rtl="0" eaLnBrk="1" latinLnBrk="0" hangingPunct="1">
+      <a:defRPr sz="1200" kern="1200">
+        <a:solidFill>
+          <a:schemeClr val="tx1"/>
+        </a:solidFill>
+        <a:latin typeface="+mn-lt"/>
+        <a:ea typeface="+mn-ea"/>
+        <a:cs typeface="+mn-cs"/>
+      </a:defRPr>
+    </a:lvl3pPr>
+    <a:lvl4pPr marL="1371600" algn="l" defTabSz="914400" rtl="0" eaLnBrk="1" latinLnBrk="0" hangingPunct="1">
+      <a:defRPr sz="1200" kern="1200">
+        <a:solidFill>
+          <a:schemeClr val="tx1"/>
+        </a:solidFill>
+        <a:latin typeface="+mn-lt"/>
+        <a:ea typeface="+mn-ea"/>
+        <a:cs typeface="+mn-cs"/>
+      </a:defRPr>
+    </a:lvl4pPr>
+    <a:lvl5pPr marL="1828800" algn="l" defTabSz="914400" rtl="0" eaLnBrk="1" latinLnBrk="0" hangingPunct="1">
+      <a:defRPr sz="1200" kern="1200">
+        <a:solidFill>
+          <a:schemeClr val="tx1"/>
+        </a:solidFill>
+        <a:latin typeface="+mn-lt"/>
+        <a:ea typeface="+mn-ea"/>
+        <a:cs typeface="+mn-cs"/>
+      </a:defRPr>
+    </a:lvl5pPr>
+    <a:lvl6pPr marL="2286000" algn="l" defTabSz="914400" rtl="0" eaLnBrk="1" latinLnBrk="0" hangingPunct="1">
+      <a:defRPr sz="1200" kern="1200">
+        <a:solidFill>
+          <a:schemeClr val="tx1"/>
+        </a:solidFill>
+        <a:latin typeface="+mn-lt"/>
+        <a:ea typeface="+mn-ea"/>
+        <a:cs typeface="+mn-cs"/>
+      </a:defRPr>
+    </a:lvl6pPr>
+    <a:lvl7pPr marL="2743200" algn="l" defTabSz="914400" rtl="0" eaLnBrk="1" latinLnBrk="0" hangingPunct="1">
+      <a:defRPr sz="1200" kern="1200">
+        <a:solidFill>
+          <a:schemeClr val="tx1"/>
+        </a:solidFill>
+        <a:latin typeface="+mn-lt"/>
+        <a:ea typeface="+mn-ea"/>
+        <a:cs typeface="+mn-cs"/>
+      </a:defRPr>
+    </a:lvl7pPr>
+    <a:lvl8pPr marL="3200400" algn="l" defTabSz="914400" rtl="0" eaLnBrk="1" latinLnBrk="0" hangingPunct="1">
+      <a:defRPr sz="1200" kern="1200">
+        <a:solidFill>
+          <a:schemeClr val="tx1"/>
+        </a:solidFill>
+        <a:latin typeface="+mn-lt"/>
+        <a:ea typeface="+mn-ea"/>
+        <a:cs typeface="+mn-cs"/>
+      </a:defRPr>
+    </a:lvl8pPr>
+    <a:lvl9pPr marL="3657600" algn="l" defTabSz="914400" rtl="0" eaLnBrk="1" latinLnBrk="0" hangingPunct="1">
+      <a:defRPr sz="1200" kern="1200">
+        <a:solidFill>
+          <a:schemeClr val="tx1"/>
+        </a:solidFill>
+        <a:latin typeface="+mn-lt"/>
+        <a:ea typeface="+mn-ea"/>
+        <a:cs typeface="+mn-cs"/>
+      </a:defRPr>
+    </a:lvl9pPr>
+  </p:notesStyle>
+</p:notesMaster>
+</file>
+
+<file path=ppt/notesSlides/notesSlide1.xml><?xml version="1.0" encoding="utf-8"?>
+<p:notes xmlns:a="http://schemas.openxmlformats.org/drawingml/2006/main" xmlns:r="http://schemas.openxmlformats.org/officeDocument/2006/relationships" xmlns:p="http://schemas.openxmlformats.org/presentationml/2006/main">
+  <p:cSld>
+    <p:spTree>
+      <p:nvGrpSpPr>
+        <p:cNvPr id="1" name=""/>
+        <p:cNvGrpSpPr/>
+        <p:nvPr/>
+      </p:nvGrpSpPr>
+      <p:grpSpPr>
+        <a:xfrm>
+          <a:off x="0" y="0"/>
+          <a:ext cx="0" cy="0"/>
+          <a:chOff x="0" y="0"/>
+          <a:chExt cx="0" cy="0"/>
+        </a:xfrm>
+      </p:grpSpPr>
+      <p:sp>
+        <p:nvSpPr>
+          <p:cNvPr id="2" name="Slide Image Placeholder 1"/>
+          <p:cNvSpPr>
+            <a:spLocks noGrp="1" noRot="1" noChangeAspect="1"/>
+          </p:cNvSpPr>
+          <p:nvPr>
+            <p:ph type="sldImg"/>
+          </p:nvPr>
+        </p:nvSpPr>
+        <p:spPr/>
+      </p:sp>
+      <p:sp>
+        <p:nvSpPr>
+          <p:cNvPr id="3" name="Notes Placeholder 2"/>
+          <p:cNvSpPr>
+            <a:spLocks noGrp="1"/>
+          </p:cNvSpPr>
+          <p:nvPr>
+            <p:ph type="body" idx="1"/>
+          </p:nvPr>
+        </p:nvSpPr>
+        <p:spPr/>
+        <p:txBody>
+          <a:bodyPr/>
+          <a:lstStyle/>
+          <a:p>
+            <a:endParaRPr lang="en-SG" dirty="0"/>
+          </a:p>
+        </p:txBody>
+      </p:sp>
+      <p:sp>
+        <p:nvSpPr>
+          <p:cNvPr id="4" name="Slide Number Placeholder 3"/>
+          <p:cNvSpPr>
+            <a:spLocks noGrp="1"/>
+          </p:cNvSpPr>
+          <p:nvPr>
+            <p:ph type="sldNum" sz="quarter" idx="5"/>
+          </p:nvPr>
+        </p:nvSpPr>
+        <p:spPr/>
+        <p:txBody>
+          <a:bodyPr/>
+          <a:lstStyle/>
+          <a:p>
+            <a:fld id="{49E40564-0516-41C4-A22F-3776F1418CF7}" type="slidenum">
+              <a:rPr lang="en-SG" smtClean="0"/>
+              <a:t>1</a:t>
+            </a:fld>
+            <a:endParaRPr lang="en-SG"/>
+          </a:p>
+        </p:txBody>
+      </p:sp>
+    </p:spTree>
+    <p:extLst>
+      <p:ext uri="{BB962C8B-B14F-4D97-AF65-F5344CB8AC3E}">
+        <p14:creationId xmlns:p14="http://schemas.microsoft.com/office/powerpoint/2010/main" val="3568512724"/>
+      </p:ext>
+    </p:extLst>
+  </p:cSld>
+  <p:clrMapOvr>
+    <a:masterClrMapping/>
+  </p:clrMapOvr>
+</p:notes>
+</file>
+
 <file path=ppt/slideLayouts/slideLayout1.xml><?xml version="1.0" encoding="utf-8"?>
 <p:sldLayout xmlns:a="http://schemas.openxmlformats.org/drawingml/2006/main" xmlns:r="http://schemas.openxmlformats.org/officeDocument/2006/relationships" xmlns:p="http://schemas.openxmlformats.org/presentationml/2006/main" type="title" preserve="1">
   <p:cSld name="Title Slide">
@@ -263,7 +701,7 @@
           <a:p>
             <a:fld id="{598B20CA-9776-494D-B069-1C390BC0F70C}" type="datetimeFigureOut">
               <a:rPr lang="en-SG" smtClean="0"/>
-              <a:t>20/4/2022</a:t>
+              <a:t>8/5/2022</a:t>
             </a:fld>
             <a:endParaRPr lang="en-SG"/>
           </a:p>
@@ -463,7 +901,7 @@
           <a:p>
             <a:fld id="{598B20CA-9776-494D-B069-1C390BC0F70C}" type="datetimeFigureOut">
               <a:rPr lang="en-SG" smtClean="0"/>
-              <a:t>20/4/2022</a:t>
+              <a:t>8/5/2022</a:t>
             </a:fld>
             <a:endParaRPr lang="en-SG"/>
           </a:p>
@@ -673,7 +1111,7 @@
           <a:p>
             <a:fld id="{598B20CA-9776-494D-B069-1C390BC0F70C}" type="datetimeFigureOut">
               <a:rPr lang="en-SG" smtClean="0"/>
-              <a:t>20/4/2022</a:t>
+              <a:t>8/5/2022</a:t>
             </a:fld>
             <a:endParaRPr lang="en-SG"/>
           </a:p>
@@ -873,7 +1311,7 @@
           <a:p>
             <a:fld id="{598B20CA-9776-494D-B069-1C390BC0F70C}" type="datetimeFigureOut">
               <a:rPr lang="en-SG" smtClean="0"/>
-              <a:t>20/4/2022</a:t>
+              <a:t>8/5/2022</a:t>
             </a:fld>
             <a:endParaRPr lang="en-SG"/>
           </a:p>
@@ -1149,7 +1587,7 @@
           <a:p>
             <a:fld id="{598B20CA-9776-494D-B069-1C390BC0F70C}" type="datetimeFigureOut">
               <a:rPr lang="en-SG" smtClean="0"/>
-              <a:t>20/4/2022</a:t>
+              <a:t>8/5/2022</a:t>
             </a:fld>
             <a:endParaRPr lang="en-SG"/>
           </a:p>
@@ -1417,7 +1855,7 @@
           <a:p>
             <a:fld id="{598B20CA-9776-494D-B069-1C390BC0F70C}" type="datetimeFigureOut">
               <a:rPr lang="en-SG" smtClean="0"/>
-              <a:t>20/4/2022</a:t>
+              <a:t>8/5/2022</a:t>
             </a:fld>
             <a:endParaRPr lang="en-SG"/>
           </a:p>
@@ -1832,7 +2270,7 @@
           <a:p>
             <a:fld id="{598B20CA-9776-494D-B069-1C390BC0F70C}" type="datetimeFigureOut">
               <a:rPr lang="en-SG" smtClean="0"/>
-              <a:t>20/4/2022</a:t>
+              <a:t>8/5/2022</a:t>
             </a:fld>
             <a:endParaRPr lang="en-SG"/>
           </a:p>
@@ -1974,7 +2412,7 @@
           <a:p>
             <a:fld id="{598B20CA-9776-494D-B069-1C390BC0F70C}" type="datetimeFigureOut">
               <a:rPr lang="en-SG" smtClean="0"/>
-              <a:t>20/4/2022</a:t>
+              <a:t>8/5/2022</a:t>
             </a:fld>
             <a:endParaRPr lang="en-SG"/>
           </a:p>
@@ -2087,7 +2525,7 @@
           <a:p>
             <a:fld id="{598B20CA-9776-494D-B069-1C390BC0F70C}" type="datetimeFigureOut">
               <a:rPr lang="en-SG" smtClean="0"/>
-              <a:t>20/4/2022</a:t>
+              <a:t>8/5/2022</a:t>
             </a:fld>
             <a:endParaRPr lang="en-SG"/>
           </a:p>
@@ -2400,7 +2838,7 @@
           <a:p>
             <a:fld id="{598B20CA-9776-494D-B069-1C390BC0F70C}" type="datetimeFigureOut">
               <a:rPr lang="en-SG" smtClean="0"/>
-              <a:t>20/4/2022</a:t>
+              <a:t>8/5/2022</a:t>
             </a:fld>
             <a:endParaRPr lang="en-SG"/>
           </a:p>
@@ -2689,7 +3127,7 @@
           <a:p>
             <a:fld id="{598B20CA-9776-494D-B069-1C390BC0F70C}" type="datetimeFigureOut">
               <a:rPr lang="en-SG" smtClean="0"/>
-              <a:t>20/4/2022</a:t>
+              <a:t>8/5/2022</a:t>
             </a:fld>
             <a:endParaRPr lang="en-SG"/>
           </a:p>
@@ -2932,7 +3370,7 @@
           <a:p>
             <a:fld id="{598B20CA-9776-494D-B069-1C390BC0F70C}" type="datetimeFigureOut">
               <a:rPr lang="en-SG" smtClean="0"/>
-              <a:t>20/4/2022</a:t>
+              <a:t>8/5/2022</a:t>
             </a:fld>
             <a:endParaRPr lang="en-SG"/>
           </a:p>
@@ -3351,6 +3789,56 @@
       </p:grpSpPr>
       <p:sp>
         <p:nvSpPr>
+          <p:cNvPr id="2" name="Rectangle 1">
+            <a:extLst>
+              <a:ext uri="{FF2B5EF4-FFF2-40B4-BE49-F238E27FC236}">
+                <a16:creationId xmlns:a16="http://schemas.microsoft.com/office/drawing/2014/main" id="{83C75C88-D36B-745B-4AC4-4363C43A3FB1}"/>
+              </a:ext>
+            </a:extLst>
+          </p:cNvPr>
+          <p:cNvSpPr/>
+          <p:nvPr/>
+        </p:nvSpPr>
+        <p:spPr>
+          <a:xfrm>
+            <a:off x="6494240" y="1826239"/>
+            <a:ext cx="1543335" cy="2066869"/>
+          </a:xfrm>
+          <a:prstGeom prst="rect">
+            <a:avLst/>
+          </a:prstGeom>
+          <a:noFill/>
+          <a:ln>
+            <a:prstDash val="dash"/>
+          </a:ln>
+        </p:spPr>
+        <p:style>
+          <a:lnRef idx="2">
+            <a:schemeClr val="accent1">
+              <a:shade val="50000"/>
+            </a:schemeClr>
+          </a:lnRef>
+          <a:fillRef idx="1">
+            <a:schemeClr val="accent1"/>
+          </a:fillRef>
+          <a:effectRef idx="0">
+            <a:schemeClr val="accent1"/>
+          </a:effectRef>
+          <a:fontRef idx="minor">
+            <a:schemeClr val="lt1"/>
+          </a:fontRef>
+        </p:style>
+        <p:txBody>
+          <a:bodyPr rtlCol="0" anchor="ctr"/>
+          <a:lstStyle/>
+          <a:p>
+            <a:pPr algn="ctr"/>
+            <a:endParaRPr lang="en-SG" dirty="0"/>
+          </a:p>
+        </p:txBody>
+      </p:sp>
+      <p:sp>
+        <p:nvSpPr>
           <p:cNvPr id="14" name="矩形: 圆角 34">
             <a:extLst>
               <a:ext uri="{FF2B5EF4-FFF2-40B4-BE49-F238E27FC236}">
@@ -3363,8 +3851,8 @@
         </p:nvSpPr>
         <p:spPr>
           <a:xfrm>
-            <a:off x="3947160" y="2665491"/>
-            <a:ext cx="1453809" cy="433370"/>
+            <a:off x="3947161" y="2665491"/>
+            <a:ext cx="1225382" cy="433370"/>
           </a:xfrm>
           <a:prstGeom prst="roundRect">
             <a:avLst/>
@@ -3483,10 +3971,10 @@
           </a:lstStyle>
           <a:p>
             <a:r>
-              <a:rPr lang="en-US" altLang="zh-CN" sz="1600" b="1" dirty="0"/>
+              <a:rPr lang="en-US" altLang="zh-CN" sz="1200" b="1" dirty="0"/>
               <a:t>Application UI</a:t>
             </a:r>
-            <a:endParaRPr lang="zh-CN" altLang="en-US" sz="1600" b="1" dirty="0"/>
+            <a:endParaRPr lang="zh-CN" altLang="en-US" sz="1200" b="1" dirty="0"/>
           </a:p>
         </p:txBody>
       </p:sp>
@@ -3504,8 +3992,8 @@
         </p:nvSpPr>
         <p:spPr>
           <a:xfrm>
-            <a:off x="6763599" y="2609878"/>
-            <a:ext cx="1356273" cy="433370"/>
+            <a:off x="6763600" y="2609878"/>
+            <a:ext cx="1093284" cy="433370"/>
           </a:xfrm>
           <a:prstGeom prst="roundRect">
             <a:avLst/>
@@ -3624,10 +4112,10 @@
           </a:lstStyle>
           <a:p>
             <a:r>
-              <a:rPr lang="en-US" altLang="zh-CN" sz="1600" b="1" dirty="0"/>
-              <a:t>Web page UI</a:t>
-            </a:r>
-            <a:endParaRPr lang="zh-CN" altLang="en-US" sz="1600" b="1" dirty="0"/>
+              <a:rPr lang="en-US" altLang="zh-CN" sz="1200" b="1" dirty="0"/>
+              <a:t>Web page UI [JavaScript]</a:t>
+            </a:r>
+            <a:endParaRPr lang="zh-CN" altLang="en-US" sz="1200" b="1" dirty="0"/>
           </a:p>
         </p:txBody>
       </p:sp>
@@ -3645,8 +4133,8 @@
         </p:nvSpPr>
         <p:spPr>
           <a:xfrm>
-            <a:off x="6845894" y="4454708"/>
-            <a:ext cx="1191681" cy="433370"/>
+            <a:off x="6940987" y="5020606"/>
+            <a:ext cx="1050490" cy="433370"/>
           </a:xfrm>
           <a:prstGeom prst="roundRect">
             <a:avLst/>
@@ -3765,10 +4253,10 @@
           </a:lstStyle>
           <a:p>
             <a:r>
-              <a:rPr lang="en-US" altLang="zh-CN" sz="1600" b="1" dirty="0"/>
+              <a:rPr lang="en-US" altLang="zh-CN" sz="1200" b="1" dirty="0"/>
               <a:t>Host [flask]</a:t>
             </a:r>
-            <a:endParaRPr lang="zh-CN" altLang="en-US" sz="1600" b="1" dirty="0"/>
+            <a:endParaRPr lang="zh-CN" altLang="en-US" sz="1200" b="1" dirty="0"/>
           </a:p>
         </p:txBody>
       </p:sp>
@@ -3782,15 +4270,14 @@
             </a:extLst>
           </p:cNvPr>
           <p:cNvCxnSpPr>
-            <a:stCxn id="15" idx="2"/>
-            <a:endCxn id="16" idx="0"/>
+            <a:cxnSpLocks/>
           </p:cNvCxnSpPr>
           <p:nvPr/>
         </p:nvCxnSpPr>
         <p:spPr>
-          <a:xfrm flipH="1">
-            <a:off x="7441735" y="3043248"/>
-            <a:ext cx="1" cy="1411460"/>
+          <a:xfrm>
+            <a:off x="7302648" y="3043248"/>
+            <a:ext cx="7594" cy="1903656"/>
           </a:xfrm>
           <a:prstGeom prst="straightConnector1">
             <a:avLst/>
@@ -3830,7 +4317,7 @@
         <p:spPr>
           <a:xfrm>
             <a:off x="2767671" y="1781612"/>
-            <a:ext cx="1453809" cy="433370"/>
+            <a:ext cx="1488056" cy="433370"/>
           </a:xfrm>
           <a:prstGeom prst="roundRect">
             <a:avLst/>
@@ -3949,10 +4436,10 @@
           </a:lstStyle>
           <a:p>
             <a:r>
-              <a:rPr lang="en-US" altLang="zh-CN" sz="1600" b="1" dirty="0"/>
-              <a:t>CTI Analyzer</a:t>
-            </a:r>
-            <a:endParaRPr lang="zh-CN" altLang="en-US" sz="1600" b="1" dirty="0"/>
+              <a:rPr lang="en-US" altLang="zh-CN" sz="1200" b="1" dirty="0"/>
+              <a:t>CTI Report Analyzer App [python]  </a:t>
+            </a:r>
+            <a:endParaRPr lang="zh-CN" altLang="en-US" sz="1200" b="1" dirty="0"/>
           </a:p>
         </p:txBody>
       </p:sp>
@@ -4009,7 +4496,7 @@
         </p:nvCxnSpPr>
         <p:spPr>
           <a:xfrm>
-            <a:off x="2904744" y="2214982"/>
+            <a:off x="2895600" y="2214982"/>
             <a:ext cx="0" cy="394896"/>
           </a:xfrm>
           <a:prstGeom prst="straightConnector1">
@@ -4168,10 +4655,10 @@
           </a:lstStyle>
           <a:p>
             <a:r>
-              <a:rPr lang="en-US" altLang="zh-CN" sz="1600" b="1" dirty="0"/>
+              <a:rPr lang="en-US" altLang="zh-CN" sz="1400" b="1" dirty="0"/>
               <a:t>Data manager</a:t>
             </a:r>
-            <a:endParaRPr lang="zh-CN" altLang="en-US" sz="1600" b="1" dirty="0"/>
+            <a:endParaRPr lang="zh-CN" altLang="en-US" sz="1400" b="1" dirty="0"/>
           </a:p>
         </p:txBody>
       </p:sp>
@@ -4230,8 +4717,8 @@
         </p:nvSpPr>
         <p:spPr>
           <a:xfrm>
-            <a:off x="2997664" y="3364231"/>
-            <a:ext cx="1453809" cy="433370"/>
+            <a:off x="2523746" y="3364231"/>
+            <a:ext cx="1927728" cy="433370"/>
           </a:xfrm>
           <a:prstGeom prst="roundRect">
             <a:avLst/>
@@ -4350,10 +4837,10 @@
           </a:lstStyle>
           <a:p>
             <a:r>
-              <a:rPr lang="en-US" altLang="zh-CN" sz="1600" b="1" dirty="0"/>
-              <a:t>COM manager</a:t>
-            </a:r>
-            <a:endParaRPr lang="zh-CN" altLang="en-US" sz="1600" b="1" dirty="0"/>
+              <a:rPr lang="en-US" altLang="zh-CN" sz="1200" b="1" dirty="0"/>
+              <a:t>Communication  manager</a:t>
+            </a:r>
+            <a:endParaRPr lang="zh-CN" altLang="en-US" sz="1200" b="1" dirty="0"/>
           </a:p>
         </p:txBody>
       </p:sp>
@@ -4367,6 +4854,7 @@
             </a:extLst>
           </p:cNvPr>
           <p:cNvCxnSpPr>
+            <a:cxnSpLocks/>
             <a:stCxn id="23" idx="3"/>
             <a:endCxn id="14" idx="1"/>
           </p:cNvCxnSpPr>
@@ -4375,7 +4863,7 @@
         <p:spPr>
           <a:xfrm>
             <a:off x="3032760" y="2875248"/>
-            <a:ext cx="914400" cy="6928"/>
+            <a:ext cx="914401" cy="6928"/>
           </a:xfrm>
           <a:prstGeom prst="straightConnector1">
             <a:avLst/>
@@ -4411,15 +4899,14 @@
             </a:extLst>
           </p:cNvPr>
           <p:cNvCxnSpPr>
-            <a:stCxn id="23" idx="2"/>
-            <a:endCxn id="26" idx="1"/>
+            <a:cxnSpLocks/>
           </p:cNvCxnSpPr>
           <p:nvPr/>
         </p:nvCxnSpPr>
         <p:spPr>
           <a:xfrm>
-            <a:off x="2305856" y="3091933"/>
-            <a:ext cx="691808" cy="488983"/>
+            <a:off x="2787351" y="3087921"/>
+            <a:ext cx="0" cy="285466"/>
           </a:xfrm>
           <a:prstGeom prst="straightConnector1">
             <a:avLst/>
@@ -4456,14 +4943,13 @@
           </p:cNvPr>
           <p:cNvCxnSpPr>
             <a:cxnSpLocks/>
-            <a:endCxn id="14" idx="2"/>
           </p:cNvCxnSpPr>
           <p:nvPr/>
         </p:nvCxnSpPr>
         <p:spPr>
           <a:xfrm flipV="1">
-            <a:off x="4443984" y="3098861"/>
-            <a:ext cx="230081" cy="502934"/>
+            <a:off x="4145642" y="3091933"/>
+            <a:ext cx="0" cy="281454"/>
           </a:xfrm>
           <a:prstGeom prst="straightConnector1">
             <a:avLst/>
@@ -4505,22 +4991,25 @@
         </p:nvCxnSpPr>
         <p:spPr>
           <a:xfrm>
-            <a:off x="1225296" y="4162772"/>
-            <a:ext cx="7900416" cy="54525"/>
+            <a:off x="1388407" y="4343918"/>
+            <a:ext cx="6989514" cy="0"/>
           </a:xfrm>
           <a:prstGeom prst="line">
             <a:avLst/>
           </a:prstGeom>
+          <a:ln w="28575">
+            <a:prstDash val="dash"/>
+          </a:ln>
         </p:spPr>
         <p:style>
           <a:lnRef idx="1">
-            <a:schemeClr val="accent1"/>
+            <a:schemeClr val="dk1"/>
           </a:lnRef>
           <a:fillRef idx="0">
-            <a:schemeClr val="accent1"/>
+            <a:schemeClr val="dk1"/>
           </a:fillRef>
           <a:effectRef idx="0">
-            <a:schemeClr val="accent1"/>
+            <a:schemeClr val="dk1"/>
           </a:effectRef>
           <a:fontRef idx="minor">
             <a:schemeClr val="tx1"/>
@@ -4536,13 +5025,15 @@
               </a:ext>
             </a:extLst>
           </p:cNvPr>
-          <p:cNvCxnSpPr/>
+          <p:cNvCxnSpPr>
+            <a:cxnSpLocks/>
+          </p:cNvCxnSpPr>
           <p:nvPr/>
         </p:nvCxnSpPr>
         <p:spPr>
-          <a:xfrm flipH="1">
-            <a:off x="3724568" y="3833478"/>
-            <a:ext cx="1" cy="1411460"/>
+          <a:xfrm>
+            <a:off x="3860771" y="3797601"/>
+            <a:ext cx="0" cy="1149303"/>
           </a:xfrm>
           <a:prstGeom prst="straightConnector1">
             <a:avLst/>
@@ -4581,7 +5072,7 @@
         </p:nvSpPr>
         <p:spPr>
           <a:xfrm>
-            <a:off x="3561545" y="5335734"/>
+            <a:off x="3323294" y="5053554"/>
             <a:ext cx="1376216" cy="433370"/>
           </a:xfrm>
           <a:prstGeom prst="roundRect">
@@ -4701,10 +5192,10 @@
           </a:lstStyle>
           <a:p>
             <a:r>
-              <a:rPr lang="en-US" altLang="zh-CN" sz="1600" b="1" dirty="0"/>
-              <a:t>Hub adapter</a:t>
-            </a:r>
-            <a:endParaRPr lang="zh-CN" altLang="en-US" sz="1600" b="1" dirty="0"/>
+              <a:rPr lang="en-US" altLang="zh-CN" sz="1200" b="1" dirty="0"/>
+              <a:t>Hub: Control  adapter [python]</a:t>
+            </a:r>
+            <a:endParaRPr lang="zh-CN" altLang="en-US" sz="1200" b="1" dirty="0"/>
           </a:p>
         </p:txBody>
       </p:sp>
@@ -4719,14 +5210,13 @@
           </p:cNvPr>
           <p:cNvCxnSpPr>
             <a:cxnSpLocks/>
-            <a:stCxn id="16" idx="1"/>
           </p:cNvCxnSpPr>
           <p:nvPr/>
         </p:nvCxnSpPr>
         <p:spPr>
           <a:xfrm flipH="1">
-            <a:off x="4968066" y="4671393"/>
-            <a:ext cx="1877828" cy="859143"/>
+            <a:off x="4803025" y="5251149"/>
+            <a:ext cx="2042869" cy="0"/>
           </a:xfrm>
           <a:prstGeom prst="straightConnector1">
             <a:avLst/>
@@ -4766,7 +5256,7 @@
           <p:nvPr/>
         </p:nvPicPr>
         <p:blipFill>
-          <a:blip r:embed="rId2">
+          <a:blip r:embed="rId3">
             <a:extLst>
               <a:ext uri="{28A0092B-C50C-407E-A947-70E740481C1C}">
                 <a14:useLocalDpi xmlns:a14="http://schemas.microsoft.com/office/drawing/2010/main" val="0"/>
@@ -4808,6 +5298,7 @@
             </a:extLst>
           </p:cNvPr>
           <p:cNvCxnSpPr>
+            <a:cxnSpLocks/>
             <a:stCxn id="50" idx="3"/>
             <a:endCxn id="15" idx="0"/>
           </p:cNvCxnSpPr>
@@ -4816,7 +5307,7 @@
         <p:spPr>
           <a:xfrm>
             <a:off x="6023967" y="1327337"/>
-            <a:ext cx="1417769" cy="1282541"/>
+            <a:ext cx="1286275" cy="1282541"/>
           </a:xfrm>
           <a:prstGeom prst="bentConnector2">
             <a:avLst/>
@@ -4859,8 +5350,8 @@
         </p:nvCxnSpPr>
         <p:spPr>
           <a:xfrm rot="10800000" flipV="1">
-            <a:off x="4674065" y="1327337"/>
-            <a:ext cx="726904" cy="1338154"/>
+            <a:off x="4559853" y="1327337"/>
+            <a:ext cx="841117" cy="1338154"/>
           </a:xfrm>
           <a:prstGeom prst="bentConnector2">
             <a:avLst/>
@@ -4948,7 +5439,7 @@
           <p:nvPr/>
         </p:nvPicPr>
         <p:blipFill>
-          <a:blip r:embed="rId3">
+          <a:blip r:embed="rId4">
             <a:extLst>
               <a:ext uri="{28A0092B-C50C-407E-A947-70E740481C1C}">
                 <a14:useLocalDpi xmlns:a14="http://schemas.microsoft.com/office/drawing/2010/main" val="0"/>
@@ -4985,6 +5476,702 @@
           </a:extLst>
         </p:spPr>
       </p:pic>
+      <p:sp>
+        <p:nvSpPr>
+          <p:cNvPr id="25" name="TextBox 24">
+            <a:extLst>
+              <a:ext uri="{FF2B5EF4-FFF2-40B4-BE49-F238E27FC236}">
+                <a16:creationId xmlns:a16="http://schemas.microsoft.com/office/drawing/2014/main" id="{54D8E78E-6EF7-9C8B-1C28-91EC69E88BA8}"/>
+              </a:ext>
+            </a:extLst>
+          </p:cNvPr>
+          <p:cNvSpPr txBox="1"/>
+          <p:nvPr/>
+        </p:nvSpPr>
+        <p:spPr>
+          <a:xfrm>
+            <a:off x="5400969" y="689227"/>
+            <a:ext cx="2294417" cy="307777"/>
+          </a:xfrm>
+          <a:prstGeom prst="rect">
+            <a:avLst/>
+          </a:prstGeom>
+          <a:noFill/>
+        </p:spPr>
+        <p:txBody>
+          <a:bodyPr wrap="square" rtlCol="0">
+            <a:spAutoFit/>
+          </a:bodyPr>
+          <a:lstStyle/>
+          <a:p>
+            <a:r>
+              <a:rPr lang="en-US" sz="1400" b="1" dirty="0"/>
+              <a:t>User</a:t>
+            </a:r>
+            <a:endParaRPr lang="en-SG" sz="1400" b="1" dirty="0"/>
+          </a:p>
+        </p:txBody>
+      </p:sp>
+      <p:pic>
+        <p:nvPicPr>
+          <p:cNvPr id="2050" name="Picture 2" descr="Local network - Free computer icons">
+            <a:extLst>
+              <a:ext uri="{FF2B5EF4-FFF2-40B4-BE49-F238E27FC236}">
+                <a16:creationId xmlns:a16="http://schemas.microsoft.com/office/drawing/2014/main" id="{38D59153-EC14-32C1-1B5D-2D0E0AFF47BD}"/>
+              </a:ext>
+            </a:extLst>
+          </p:cNvPr>
+          <p:cNvPicPr>
+            <a:picLocks noChangeAspect="1" noChangeArrowheads="1"/>
+          </p:cNvPicPr>
+          <p:nvPr/>
+        </p:nvPicPr>
+        <p:blipFill>
+          <a:blip r:embed="rId5">
+            <a:extLst>
+              <a:ext uri="{28A0092B-C50C-407E-A947-70E740481C1C}">
+                <a14:useLocalDpi xmlns:a14="http://schemas.microsoft.com/office/drawing/2010/main" val="0"/>
+              </a:ext>
+            </a:extLst>
+          </a:blip>
+          <a:srcRect/>
+          <a:stretch>
+            <a:fillRect/>
+          </a:stretch>
+        </p:blipFill>
+        <p:spPr bwMode="auto">
+          <a:xfrm>
+            <a:off x="1557422" y="1780549"/>
+            <a:ext cx="491379" cy="491379"/>
+          </a:xfrm>
+          <a:prstGeom prst="rect">
+            <a:avLst/>
+          </a:prstGeom>
+          <a:noFill/>
+          <a:extLst>
+            <a:ext uri="{909E8E84-426E-40DD-AFC4-6F175D3DCCD1}">
+              <a14:hiddenFill xmlns:a14="http://schemas.microsoft.com/office/drawing/2010/main">
+                <a:solidFill>
+                  <a:srgbClr val="FFFFFF"/>
+                </a:solidFill>
+              </a14:hiddenFill>
+            </a:ext>
+          </a:extLst>
+        </p:spPr>
+      </p:pic>
+      <p:sp>
+        <p:nvSpPr>
+          <p:cNvPr id="29" name="TextBox 28">
+            <a:extLst>
+              <a:ext uri="{FF2B5EF4-FFF2-40B4-BE49-F238E27FC236}">
+                <a16:creationId xmlns:a16="http://schemas.microsoft.com/office/drawing/2014/main" id="{0E80301D-0D21-D65D-D40E-E4226EAF35DC}"/>
+              </a:ext>
+            </a:extLst>
+          </p:cNvPr>
+          <p:cNvSpPr txBox="1"/>
+          <p:nvPr/>
+        </p:nvSpPr>
+        <p:spPr>
+          <a:xfrm>
+            <a:off x="4711701" y="1711473"/>
+            <a:ext cx="2294417" cy="276999"/>
+          </a:xfrm>
+          <a:prstGeom prst="rect">
+            <a:avLst/>
+          </a:prstGeom>
+          <a:noFill/>
+        </p:spPr>
+        <p:txBody>
+          <a:bodyPr wrap="square" rtlCol="0">
+            <a:spAutoFit/>
+          </a:bodyPr>
+          <a:lstStyle/>
+          <a:p>
+            <a:r>
+              <a:rPr lang="en-US" sz="1200" b="1" dirty="0"/>
+              <a:t>Local PC</a:t>
+            </a:r>
+            <a:endParaRPr lang="en-SG" sz="1200" b="1" dirty="0"/>
+          </a:p>
+        </p:txBody>
+      </p:sp>
+      <p:sp>
+        <p:nvSpPr>
+          <p:cNvPr id="39" name="Rectangle 38">
+            <a:extLst>
+              <a:ext uri="{FF2B5EF4-FFF2-40B4-BE49-F238E27FC236}">
+                <a16:creationId xmlns:a16="http://schemas.microsoft.com/office/drawing/2014/main" id="{907246B3-C5E5-C7C6-108D-8E4F042DBD7F}"/>
+              </a:ext>
+            </a:extLst>
+          </p:cNvPr>
+          <p:cNvSpPr/>
+          <p:nvPr/>
+        </p:nvSpPr>
+        <p:spPr>
+          <a:xfrm>
+            <a:off x="1469136" y="1675023"/>
+            <a:ext cx="3876695" cy="2274088"/>
+          </a:xfrm>
+          <a:prstGeom prst="rect">
+            <a:avLst/>
+          </a:prstGeom>
+          <a:noFill/>
+          <a:ln>
+            <a:prstDash val="dash"/>
+          </a:ln>
+        </p:spPr>
+        <p:style>
+          <a:lnRef idx="2">
+            <a:schemeClr val="accent1">
+              <a:shade val="50000"/>
+            </a:schemeClr>
+          </a:lnRef>
+          <a:fillRef idx="1">
+            <a:schemeClr val="accent1"/>
+          </a:fillRef>
+          <a:effectRef idx="0">
+            <a:schemeClr val="accent1"/>
+          </a:effectRef>
+          <a:fontRef idx="minor">
+            <a:schemeClr val="lt1"/>
+          </a:fontRef>
+        </p:style>
+        <p:txBody>
+          <a:bodyPr rtlCol="0" anchor="ctr"/>
+          <a:lstStyle/>
+          <a:p>
+            <a:pPr algn="ctr"/>
+            <a:endParaRPr lang="en-SG" dirty="0"/>
+          </a:p>
+        </p:txBody>
+      </p:sp>
+      <p:pic>
+        <p:nvPicPr>
+          <p:cNvPr id="2052" name="Picture 4" descr="Web browser icon, internet browser for commercial, print media, web or any  type of design projects Stock Vector Image &amp; Art - Alamy">
+            <a:extLst>
+              <a:ext uri="{FF2B5EF4-FFF2-40B4-BE49-F238E27FC236}">
+                <a16:creationId xmlns:a16="http://schemas.microsoft.com/office/drawing/2014/main" id="{6459834A-EDE9-C7BF-E94D-D36346A86E9D}"/>
+              </a:ext>
+            </a:extLst>
+          </p:cNvPr>
+          <p:cNvPicPr>
+            <a:picLocks noChangeAspect="1" noChangeArrowheads="1"/>
+          </p:cNvPicPr>
+          <p:nvPr/>
+        </p:nvPicPr>
+        <p:blipFill>
+          <a:blip r:embed="rId6">
+            <a:extLst>
+              <a:ext uri="{28A0092B-C50C-407E-A947-70E740481C1C}">
+                <a14:useLocalDpi xmlns:a14="http://schemas.microsoft.com/office/drawing/2010/main" val="0"/>
+              </a:ext>
+            </a:extLst>
+          </a:blip>
+          <a:srcRect/>
+          <a:stretch>
+            <a:fillRect/>
+          </a:stretch>
+        </p:blipFill>
+        <p:spPr bwMode="auto">
+          <a:xfrm>
+            <a:off x="6577270" y="1918462"/>
+            <a:ext cx="537248" cy="447707"/>
+          </a:xfrm>
+          <a:prstGeom prst="rect">
+            <a:avLst/>
+          </a:prstGeom>
+          <a:noFill/>
+          <a:extLst>
+            <a:ext uri="{909E8E84-426E-40DD-AFC4-6F175D3DCCD1}">
+              <a14:hiddenFill xmlns:a14="http://schemas.microsoft.com/office/drawing/2010/main">
+                <a:solidFill>
+                  <a:srgbClr val="FFFFFF"/>
+                </a:solidFill>
+              </a14:hiddenFill>
+            </a:ext>
+          </a:extLst>
+        </p:spPr>
+      </p:pic>
+      <p:sp>
+        <p:nvSpPr>
+          <p:cNvPr id="43" name="TextBox 42">
+            <a:extLst>
+              <a:ext uri="{FF2B5EF4-FFF2-40B4-BE49-F238E27FC236}">
+                <a16:creationId xmlns:a16="http://schemas.microsoft.com/office/drawing/2014/main" id="{52873DD6-04B5-AD57-2960-A46099E19D2E}"/>
+              </a:ext>
+            </a:extLst>
+          </p:cNvPr>
+          <p:cNvSpPr txBox="1"/>
+          <p:nvPr/>
+        </p:nvSpPr>
+        <p:spPr>
+          <a:xfrm>
+            <a:off x="7311442" y="1866482"/>
+            <a:ext cx="2294417" cy="276999"/>
+          </a:xfrm>
+          <a:prstGeom prst="rect">
+            <a:avLst/>
+          </a:prstGeom>
+          <a:noFill/>
+        </p:spPr>
+        <p:txBody>
+          <a:bodyPr wrap="square" rtlCol="0">
+            <a:spAutoFit/>
+          </a:bodyPr>
+          <a:lstStyle/>
+          <a:p>
+            <a:r>
+              <a:rPr lang="en-US" sz="1200" b="1" dirty="0"/>
+              <a:t>Browser</a:t>
+            </a:r>
+            <a:endParaRPr lang="en-SG" sz="1200" b="1" dirty="0"/>
+          </a:p>
+        </p:txBody>
+      </p:sp>
+      <p:sp>
+        <p:nvSpPr>
+          <p:cNvPr id="55" name="TextBox 54">
+            <a:extLst>
+              <a:ext uri="{FF2B5EF4-FFF2-40B4-BE49-F238E27FC236}">
+                <a16:creationId xmlns:a16="http://schemas.microsoft.com/office/drawing/2014/main" id="{62AC35AF-8AAA-0952-AD6A-D1C50F7458FD}"/>
+              </a:ext>
+            </a:extLst>
+          </p:cNvPr>
+          <p:cNvSpPr txBox="1"/>
+          <p:nvPr/>
+        </p:nvSpPr>
+        <p:spPr>
+          <a:xfrm>
+            <a:off x="5400969" y="4337570"/>
+            <a:ext cx="2294417" cy="276999"/>
+          </a:xfrm>
+          <a:prstGeom prst="rect">
+            <a:avLst/>
+          </a:prstGeom>
+          <a:noFill/>
+        </p:spPr>
+        <p:txBody>
+          <a:bodyPr wrap="square" rtlCol="0">
+            <a:spAutoFit/>
+          </a:bodyPr>
+          <a:lstStyle/>
+          <a:p>
+            <a:r>
+              <a:rPr lang="en-US" sz="1200" dirty="0"/>
+              <a:t>Internet</a:t>
+            </a:r>
+            <a:endParaRPr lang="en-SG" sz="1200" dirty="0"/>
+          </a:p>
+        </p:txBody>
+      </p:sp>
+      <p:sp>
+        <p:nvSpPr>
+          <p:cNvPr id="57" name="TextBox 56">
+            <a:extLst>
+              <a:ext uri="{FF2B5EF4-FFF2-40B4-BE49-F238E27FC236}">
+                <a16:creationId xmlns:a16="http://schemas.microsoft.com/office/drawing/2014/main" id="{0C002D10-E4D7-7583-219C-BC7BCB2E046F}"/>
+              </a:ext>
+            </a:extLst>
+          </p:cNvPr>
+          <p:cNvSpPr txBox="1"/>
+          <p:nvPr/>
+        </p:nvSpPr>
+        <p:spPr>
+          <a:xfrm>
+            <a:off x="2649064" y="3994869"/>
+            <a:ext cx="1677092" cy="276999"/>
+          </a:xfrm>
+          <a:prstGeom prst="rect">
+            <a:avLst/>
+          </a:prstGeom>
+          <a:noFill/>
+        </p:spPr>
+        <p:txBody>
+          <a:bodyPr wrap="square" rtlCol="0">
+            <a:spAutoFit/>
+          </a:bodyPr>
+          <a:lstStyle/>
+          <a:p>
+            <a:r>
+              <a:rPr lang="en-US" sz="1200" dirty="0"/>
+              <a:t>Synchronous UDP / TLS</a:t>
+            </a:r>
+            <a:endParaRPr lang="en-SG" sz="1200" dirty="0"/>
+          </a:p>
+        </p:txBody>
+      </p:sp>
+      <p:sp>
+        <p:nvSpPr>
+          <p:cNvPr id="61" name="TextBox 60">
+            <a:extLst>
+              <a:ext uri="{FF2B5EF4-FFF2-40B4-BE49-F238E27FC236}">
+                <a16:creationId xmlns:a16="http://schemas.microsoft.com/office/drawing/2014/main" id="{6D55AACD-D494-826C-B439-39206F44CD80}"/>
+              </a:ext>
+            </a:extLst>
+          </p:cNvPr>
+          <p:cNvSpPr txBox="1"/>
+          <p:nvPr/>
+        </p:nvSpPr>
+        <p:spPr>
+          <a:xfrm>
+            <a:off x="7337204" y="3947946"/>
+            <a:ext cx="1677092" cy="276999"/>
+          </a:xfrm>
+          <a:prstGeom prst="rect">
+            <a:avLst/>
+          </a:prstGeom>
+          <a:noFill/>
+        </p:spPr>
+        <p:txBody>
+          <a:bodyPr wrap="square" rtlCol="0">
+            <a:spAutoFit/>
+          </a:bodyPr>
+          <a:lstStyle/>
+          <a:p>
+            <a:r>
+              <a:rPr lang="en-US" sz="1200" dirty="0"/>
+              <a:t>Socket.IO</a:t>
+            </a:r>
+            <a:endParaRPr lang="en-SG" sz="1200" dirty="0"/>
+          </a:p>
+        </p:txBody>
+      </p:sp>
+      <p:pic>
+        <p:nvPicPr>
+          <p:cNvPr id="2054" name="Picture 6" descr="Office, database Icon in Super Flat Remix V1.08">
+            <a:extLst>
+              <a:ext uri="{FF2B5EF4-FFF2-40B4-BE49-F238E27FC236}">
+                <a16:creationId xmlns:a16="http://schemas.microsoft.com/office/drawing/2014/main" id="{6D9F65FA-06DE-C058-0D59-23C4C49296B9}"/>
+              </a:ext>
+            </a:extLst>
+          </p:cNvPr>
+          <p:cNvPicPr>
+            <a:picLocks noChangeAspect="1" noChangeArrowheads="1"/>
+          </p:cNvPicPr>
+          <p:nvPr/>
+        </p:nvPicPr>
+        <p:blipFill>
+          <a:blip r:embed="rId7">
+            <a:extLst>
+              <a:ext uri="{28A0092B-C50C-407E-A947-70E740481C1C}">
+                <a14:useLocalDpi xmlns:a14="http://schemas.microsoft.com/office/drawing/2010/main" val="0"/>
+              </a:ext>
+            </a:extLst>
+          </a:blip>
+          <a:srcRect/>
+          <a:stretch>
+            <a:fillRect/>
+          </a:stretch>
+        </p:blipFill>
+        <p:spPr bwMode="auto">
+          <a:xfrm>
+            <a:off x="1984566" y="5006987"/>
+            <a:ext cx="526504" cy="526504"/>
+          </a:xfrm>
+          <a:prstGeom prst="rect">
+            <a:avLst/>
+          </a:prstGeom>
+          <a:noFill/>
+          <a:extLst>
+            <a:ext uri="{909E8E84-426E-40DD-AFC4-6F175D3DCCD1}">
+              <a14:hiddenFill xmlns:a14="http://schemas.microsoft.com/office/drawing/2010/main">
+                <a:solidFill>
+                  <a:srgbClr val="FFFFFF"/>
+                </a:solidFill>
+              </a14:hiddenFill>
+            </a:ext>
+          </a:extLst>
+        </p:spPr>
+      </p:pic>
+      <p:cxnSp>
+        <p:nvCxnSpPr>
+          <p:cNvPr id="62" name="Straight Arrow Connector 61">
+            <a:extLst>
+              <a:ext uri="{FF2B5EF4-FFF2-40B4-BE49-F238E27FC236}">
+                <a16:creationId xmlns:a16="http://schemas.microsoft.com/office/drawing/2014/main" id="{B92C849B-6941-1444-E2FD-4AC5460E2850}"/>
+              </a:ext>
+            </a:extLst>
+          </p:cNvPr>
+          <p:cNvCxnSpPr>
+            <a:cxnSpLocks/>
+          </p:cNvCxnSpPr>
+          <p:nvPr/>
+        </p:nvCxnSpPr>
+        <p:spPr>
+          <a:xfrm flipH="1">
+            <a:off x="2571777" y="5237291"/>
+            <a:ext cx="622415" cy="0"/>
+          </a:xfrm>
+          <a:prstGeom prst="straightConnector1">
+            <a:avLst/>
+          </a:prstGeom>
+          <a:ln>
+            <a:headEnd type="triangle"/>
+            <a:tailEnd type="triangle"/>
+          </a:ln>
+        </p:spPr>
+        <p:style>
+          <a:lnRef idx="1">
+            <a:schemeClr val="accent1"/>
+          </a:lnRef>
+          <a:fillRef idx="0">
+            <a:schemeClr val="accent1"/>
+          </a:fillRef>
+          <a:effectRef idx="0">
+            <a:schemeClr val="accent1"/>
+          </a:effectRef>
+          <a:fontRef idx="minor">
+            <a:schemeClr val="tx1"/>
+          </a:fontRef>
+        </p:style>
+      </p:cxnSp>
+      <p:sp>
+        <p:nvSpPr>
+          <p:cNvPr id="63" name="TextBox 62">
+            <a:extLst>
+              <a:ext uri="{FF2B5EF4-FFF2-40B4-BE49-F238E27FC236}">
+                <a16:creationId xmlns:a16="http://schemas.microsoft.com/office/drawing/2014/main" id="{6742636E-BCFD-2F4B-7117-6FC3E1349F46}"/>
+              </a:ext>
+            </a:extLst>
+          </p:cNvPr>
+          <p:cNvSpPr txBox="1"/>
+          <p:nvPr/>
+        </p:nvSpPr>
+        <p:spPr>
+          <a:xfrm>
+            <a:off x="1803111" y="5562217"/>
+            <a:ext cx="1677092" cy="276999"/>
+          </a:xfrm>
+          <a:prstGeom prst="rect">
+            <a:avLst/>
+          </a:prstGeom>
+          <a:noFill/>
+        </p:spPr>
+        <p:txBody>
+          <a:bodyPr wrap="square" rtlCol="0">
+            <a:spAutoFit/>
+          </a:bodyPr>
+          <a:lstStyle/>
+          <a:p>
+            <a:r>
+              <a:rPr lang="en-US" sz="1200" b="1" dirty="0"/>
+              <a:t>CTI Report analyzer DB</a:t>
+            </a:r>
+            <a:endParaRPr lang="en-SG" sz="1200" b="1" dirty="0"/>
+          </a:p>
+        </p:txBody>
+      </p:sp>
+      <p:pic>
+        <p:nvPicPr>
+          <p:cNvPr id="2056" name="Picture 8" descr="Software - Free technology icons">
+            <a:extLst>
+              <a:ext uri="{FF2B5EF4-FFF2-40B4-BE49-F238E27FC236}">
+                <a16:creationId xmlns:a16="http://schemas.microsoft.com/office/drawing/2014/main" id="{890AFD10-162A-40B9-91C0-9F5ADE81492C}"/>
+              </a:ext>
+            </a:extLst>
+          </p:cNvPr>
+          <p:cNvPicPr>
+            <a:picLocks noChangeAspect="1" noChangeArrowheads="1"/>
+          </p:cNvPicPr>
+          <p:nvPr/>
+        </p:nvPicPr>
+        <p:blipFill>
+          <a:blip r:embed="rId8">
+            <a:extLst>
+              <a:ext uri="{28A0092B-C50C-407E-A947-70E740481C1C}">
+                <a14:useLocalDpi xmlns:a14="http://schemas.microsoft.com/office/drawing/2010/main" val="0"/>
+              </a:ext>
+            </a:extLst>
+          </a:blip>
+          <a:srcRect/>
+          <a:stretch>
+            <a:fillRect/>
+          </a:stretch>
+        </p:blipFill>
+        <p:spPr bwMode="auto">
+          <a:xfrm>
+            <a:off x="3618662" y="5906967"/>
+            <a:ext cx="459562" cy="459562"/>
+          </a:xfrm>
+          <a:prstGeom prst="rect">
+            <a:avLst/>
+          </a:prstGeom>
+          <a:noFill/>
+          <a:extLst>
+            <a:ext uri="{909E8E84-426E-40DD-AFC4-6F175D3DCCD1}">
+              <a14:hiddenFill xmlns:a14="http://schemas.microsoft.com/office/drawing/2010/main">
+                <a:solidFill>
+                  <a:srgbClr val="FFFFFF"/>
+                </a:solidFill>
+              </a14:hiddenFill>
+            </a:ext>
+          </a:extLst>
+        </p:spPr>
+      </p:pic>
+      <p:cxnSp>
+        <p:nvCxnSpPr>
+          <p:cNvPr id="64" name="Straight Arrow Connector 63">
+            <a:extLst>
+              <a:ext uri="{FF2B5EF4-FFF2-40B4-BE49-F238E27FC236}">
+                <a16:creationId xmlns:a16="http://schemas.microsoft.com/office/drawing/2014/main" id="{A09B17D8-E9FD-A97A-6E3C-5E2971F4CCC7}"/>
+              </a:ext>
+            </a:extLst>
+          </p:cNvPr>
+          <p:cNvCxnSpPr>
+            <a:cxnSpLocks/>
+          </p:cNvCxnSpPr>
+          <p:nvPr/>
+        </p:nvCxnSpPr>
+        <p:spPr>
+          <a:xfrm flipV="1">
+            <a:off x="3858494" y="5533491"/>
+            <a:ext cx="0" cy="334453"/>
+          </a:xfrm>
+          <a:prstGeom prst="straightConnector1">
+            <a:avLst/>
+          </a:prstGeom>
+          <a:ln>
+            <a:headEnd type="triangle"/>
+            <a:tailEnd type="triangle"/>
+          </a:ln>
+        </p:spPr>
+        <p:style>
+          <a:lnRef idx="1">
+            <a:schemeClr val="accent1"/>
+          </a:lnRef>
+          <a:fillRef idx="0">
+            <a:schemeClr val="accent1"/>
+          </a:fillRef>
+          <a:effectRef idx="0">
+            <a:schemeClr val="accent1"/>
+          </a:effectRef>
+          <a:fontRef idx="minor">
+            <a:schemeClr val="tx1"/>
+          </a:fontRef>
+        </p:style>
+      </p:cxnSp>
+      <p:sp>
+        <p:nvSpPr>
+          <p:cNvPr id="65" name="TextBox 64">
+            <a:extLst>
+              <a:ext uri="{FF2B5EF4-FFF2-40B4-BE49-F238E27FC236}">
+                <a16:creationId xmlns:a16="http://schemas.microsoft.com/office/drawing/2014/main" id="{94152B4E-ACF3-E621-9036-6F73C82D1B25}"/>
+              </a:ext>
+            </a:extLst>
+          </p:cNvPr>
+          <p:cNvSpPr txBox="1"/>
+          <p:nvPr/>
+        </p:nvSpPr>
+        <p:spPr>
+          <a:xfrm>
+            <a:off x="4079824" y="5919560"/>
+            <a:ext cx="1677092" cy="276999"/>
+          </a:xfrm>
+          <a:prstGeom prst="rect">
+            <a:avLst/>
+          </a:prstGeom>
+          <a:noFill/>
+        </p:spPr>
+        <p:txBody>
+          <a:bodyPr wrap="square" rtlCol="0">
+            <a:spAutoFit/>
+          </a:bodyPr>
+          <a:lstStyle/>
+          <a:p>
+            <a:r>
+              <a:rPr lang="en-US" sz="1200" b="1" dirty="0"/>
+              <a:t>CTI Report analyzer</a:t>
+            </a:r>
+            <a:endParaRPr lang="en-SG" sz="1200" b="1" dirty="0"/>
+          </a:p>
+        </p:txBody>
+      </p:sp>
+      <p:sp>
+        <p:nvSpPr>
+          <p:cNvPr id="66" name="Rectangle 65">
+            <a:extLst>
+              <a:ext uri="{FF2B5EF4-FFF2-40B4-BE49-F238E27FC236}">
+                <a16:creationId xmlns:a16="http://schemas.microsoft.com/office/drawing/2014/main" id="{A8645B65-A157-AB29-FD9A-20F286A28ED9}"/>
+              </a:ext>
+            </a:extLst>
+          </p:cNvPr>
+          <p:cNvSpPr/>
+          <p:nvPr/>
+        </p:nvSpPr>
+        <p:spPr>
+          <a:xfrm>
+            <a:off x="1869398" y="4770941"/>
+            <a:ext cx="6369346" cy="1666436"/>
+          </a:xfrm>
+          <a:prstGeom prst="rect">
+            <a:avLst/>
+          </a:prstGeom>
+          <a:noFill/>
+          <a:ln>
+            <a:prstDash val="dash"/>
+          </a:ln>
+        </p:spPr>
+        <p:style>
+          <a:lnRef idx="2">
+            <a:schemeClr val="accent1">
+              <a:shade val="50000"/>
+            </a:schemeClr>
+          </a:lnRef>
+          <a:fillRef idx="1">
+            <a:schemeClr val="accent1"/>
+          </a:fillRef>
+          <a:effectRef idx="0">
+            <a:schemeClr val="accent1"/>
+          </a:effectRef>
+          <a:fontRef idx="minor">
+            <a:schemeClr val="lt1"/>
+          </a:fontRef>
+        </p:style>
+        <p:txBody>
+          <a:bodyPr rtlCol="0" anchor="ctr"/>
+          <a:lstStyle/>
+          <a:p>
+            <a:pPr algn="ctr"/>
+            <a:endParaRPr lang="en-SG" dirty="0"/>
+          </a:p>
+        </p:txBody>
+      </p:sp>
+      <p:sp>
+        <p:nvSpPr>
+          <p:cNvPr id="67" name="TextBox 66">
+            <a:extLst>
+              <a:ext uri="{FF2B5EF4-FFF2-40B4-BE49-F238E27FC236}">
+                <a16:creationId xmlns:a16="http://schemas.microsoft.com/office/drawing/2014/main" id="{485C1C0B-FD9B-83ED-0C0A-4937ED08704D}"/>
+              </a:ext>
+            </a:extLst>
+          </p:cNvPr>
+          <p:cNvSpPr txBox="1"/>
+          <p:nvPr/>
+        </p:nvSpPr>
+        <p:spPr>
+          <a:xfrm>
+            <a:off x="7462496" y="6103706"/>
+            <a:ext cx="2294417" cy="276999"/>
+          </a:xfrm>
+          <a:prstGeom prst="rect">
+            <a:avLst/>
+          </a:prstGeom>
+          <a:noFill/>
+        </p:spPr>
+        <p:txBody>
+          <a:bodyPr wrap="square" rtlCol="0">
+            <a:spAutoFit/>
+          </a:bodyPr>
+          <a:lstStyle/>
+          <a:p>
+            <a:r>
+              <a:rPr lang="en-US" sz="1200" b="1" dirty="0"/>
+              <a:t>NCL server</a:t>
+            </a:r>
+            <a:endParaRPr lang="en-SG" sz="1200" b="1" dirty="0"/>
+          </a:p>
+        </p:txBody>
+      </p:sp>
     </p:spTree>
     <p:extLst>
       <p:ext uri="{BB962C8B-B14F-4D97-AF65-F5344CB8AC3E}">
@@ -5017,6 +6204,56 @@
       </p:grpSpPr>
       <p:sp>
         <p:nvSpPr>
+          <p:cNvPr id="10" name="Rectangle 9">
+            <a:extLst>
+              <a:ext uri="{FF2B5EF4-FFF2-40B4-BE49-F238E27FC236}">
+                <a16:creationId xmlns:a16="http://schemas.microsoft.com/office/drawing/2014/main" id="{9B125A40-6084-51EB-61D1-D104701DAA72}"/>
+              </a:ext>
+            </a:extLst>
+          </p:cNvPr>
+          <p:cNvSpPr/>
+          <p:nvPr/>
+        </p:nvSpPr>
+        <p:spPr>
+          <a:xfrm>
+            <a:off x="713232" y="795528"/>
+            <a:ext cx="6922008" cy="5705856"/>
+          </a:xfrm>
+          <a:prstGeom prst="rect">
+            <a:avLst/>
+          </a:prstGeom>
+          <a:noFill/>
+          <a:ln>
+            <a:prstDash val="dash"/>
+          </a:ln>
+        </p:spPr>
+        <p:style>
+          <a:lnRef idx="2">
+            <a:schemeClr val="accent1">
+              <a:shade val="50000"/>
+            </a:schemeClr>
+          </a:lnRef>
+          <a:fillRef idx="1">
+            <a:schemeClr val="accent1"/>
+          </a:fillRef>
+          <a:effectRef idx="0">
+            <a:schemeClr val="accent1"/>
+          </a:effectRef>
+          <a:fontRef idx="minor">
+            <a:schemeClr val="lt1"/>
+          </a:fontRef>
+        </p:style>
+        <p:txBody>
+          <a:bodyPr rtlCol="0" anchor="ctr"/>
+          <a:lstStyle/>
+          <a:p>
+            <a:pPr algn="ctr"/>
+            <a:endParaRPr lang="en-SG" dirty="0"/>
+          </a:p>
+        </p:txBody>
+      </p:sp>
+      <p:sp>
+        <p:nvSpPr>
           <p:cNvPr id="59" name="TextBox 58">
             <a:extLst>
               <a:ext uri="{FF2B5EF4-FFF2-40B4-BE49-F238E27FC236}">
@@ -5058,7 +6295,7 @@
                   <a:schemeClr val="bg1"/>
                 </a:solidFill>
               </a:rPr>
-              <a:t>Analyzer UI design [action layer above the animation layer] </a:t>
+              <a:t>Analyzer[threading] communication diagram </a:t>
             </a:r>
           </a:p>
         </p:txBody>
@@ -5117,6 +6354,624 @@
       </p:pic>
       <p:pic>
         <p:nvPicPr>
+          <p:cNvPr id="1026" name="Picture 2" descr="Use CTITest to Troubleshoot IPCC Agent Login Problems - Cisco">
+            <a:extLst>
+              <a:ext uri="{FF2B5EF4-FFF2-40B4-BE49-F238E27FC236}">
+                <a16:creationId xmlns:a16="http://schemas.microsoft.com/office/drawing/2014/main" id="{D76C6F19-1ADD-0FD9-DF79-BE06622E72A4}"/>
+              </a:ext>
+            </a:extLst>
+          </p:cNvPr>
+          <p:cNvPicPr>
+            <a:picLocks noChangeAspect="1" noChangeArrowheads="1"/>
+          </p:cNvPicPr>
+          <p:nvPr/>
+        </p:nvPicPr>
+        <p:blipFill>
+          <a:blip r:embed="rId3">
+            <a:extLst>
+              <a:ext uri="{28A0092B-C50C-407E-A947-70E740481C1C}">
+                <a14:useLocalDpi xmlns:a14="http://schemas.microsoft.com/office/drawing/2010/main" val="0"/>
+              </a:ext>
+            </a:extLst>
+          </a:blip>
+          <a:srcRect/>
+          <a:stretch>
+            <a:fillRect/>
+          </a:stretch>
+        </p:blipFill>
+        <p:spPr bwMode="auto">
+          <a:xfrm>
+            <a:off x="883696" y="1051152"/>
+            <a:ext cx="2996238" cy="1756056"/>
+          </a:xfrm>
+          <a:prstGeom prst="rect">
+            <a:avLst/>
+          </a:prstGeom>
+          <a:noFill/>
+          <a:extLst>
+            <a:ext uri="{909E8E84-426E-40DD-AFC4-6F175D3DCCD1}">
+              <a14:hiddenFill xmlns:a14="http://schemas.microsoft.com/office/drawing/2010/main">
+                <a:solidFill>
+                  <a:srgbClr val="FFFFFF"/>
+                </a:solidFill>
+              </a14:hiddenFill>
+            </a:ext>
+          </a:extLst>
+        </p:spPr>
+      </p:pic>
+      <p:pic>
+        <p:nvPicPr>
+          <p:cNvPr id="4" name="Picture 3">
+            <a:extLst>
+              <a:ext uri="{FF2B5EF4-FFF2-40B4-BE49-F238E27FC236}">
+                <a16:creationId xmlns:a16="http://schemas.microsoft.com/office/drawing/2014/main" id="{ECAB1ED7-6DDF-23E7-1F24-FD9D746EA95F}"/>
+              </a:ext>
+            </a:extLst>
+          </p:cNvPr>
+          <p:cNvPicPr>
+            <a:picLocks noChangeAspect="1"/>
+          </p:cNvPicPr>
+          <p:nvPr/>
+        </p:nvPicPr>
+        <p:blipFill>
+          <a:blip r:embed="rId4"/>
+          <a:stretch>
+            <a:fillRect/>
+          </a:stretch>
+        </p:blipFill>
+        <p:spPr>
+          <a:xfrm>
+            <a:off x="4517541" y="1051153"/>
+            <a:ext cx="2844235" cy="1756056"/>
+          </a:xfrm>
+          <a:prstGeom prst="rect">
+            <a:avLst/>
+          </a:prstGeom>
+          <a:ln w="3175">
+            <a:solidFill>
+              <a:schemeClr val="tx1"/>
+            </a:solidFill>
+          </a:ln>
+        </p:spPr>
+      </p:pic>
+      <p:pic>
+        <p:nvPicPr>
+          <p:cNvPr id="27" name="Picture 26">
+            <a:extLst>
+              <a:ext uri="{FF2B5EF4-FFF2-40B4-BE49-F238E27FC236}">
+                <a16:creationId xmlns:a16="http://schemas.microsoft.com/office/drawing/2014/main" id="{B7F0901D-7074-D84B-5820-F41A7B58E4D2}"/>
+              </a:ext>
+            </a:extLst>
+          </p:cNvPr>
+          <p:cNvPicPr>
+            <a:picLocks noChangeAspect="1"/>
+          </p:cNvPicPr>
+          <p:nvPr/>
+        </p:nvPicPr>
+        <p:blipFill>
+          <a:blip r:embed="rId5"/>
+          <a:stretch>
+            <a:fillRect/>
+          </a:stretch>
+        </p:blipFill>
+        <p:spPr>
+          <a:xfrm>
+            <a:off x="1385119" y="3465576"/>
+            <a:ext cx="3955704" cy="2836957"/>
+          </a:xfrm>
+          <a:prstGeom prst="rect">
+            <a:avLst/>
+          </a:prstGeom>
+        </p:spPr>
+      </p:pic>
+      <p:sp>
+        <p:nvSpPr>
+          <p:cNvPr id="6" name="Arrow: Down 5">
+            <a:extLst>
+              <a:ext uri="{FF2B5EF4-FFF2-40B4-BE49-F238E27FC236}">
+                <a16:creationId xmlns:a16="http://schemas.microsoft.com/office/drawing/2014/main" id="{1A2460D6-7EE5-CB31-F55E-92AF4EEE6241}"/>
+              </a:ext>
+            </a:extLst>
+          </p:cNvPr>
+          <p:cNvSpPr/>
+          <p:nvPr/>
+        </p:nvSpPr>
+        <p:spPr>
+          <a:xfrm>
+            <a:off x="3447288" y="2962656"/>
+            <a:ext cx="173736" cy="377203"/>
+          </a:xfrm>
+          <a:prstGeom prst="downArrow">
+            <a:avLst/>
+          </a:prstGeom>
+        </p:spPr>
+        <p:style>
+          <a:lnRef idx="2">
+            <a:schemeClr val="accent1">
+              <a:shade val="50000"/>
+            </a:schemeClr>
+          </a:lnRef>
+          <a:fillRef idx="1">
+            <a:schemeClr val="accent1"/>
+          </a:fillRef>
+          <a:effectRef idx="0">
+            <a:schemeClr val="accent1"/>
+          </a:effectRef>
+          <a:fontRef idx="minor">
+            <a:schemeClr val="lt1"/>
+          </a:fontRef>
+        </p:style>
+        <p:txBody>
+          <a:bodyPr rtlCol="0" anchor="ctr"/>
+          <a:lstStyle/>
+          <a:p>
+            <a:pPr algn="ctr"/>
+            <a:endParaRPr lang="en-SG"/>
+          </a:p>
+        </p:txBody>
+      </p:sp>
+      <p:sp>
+        <p:nvSpPr>
+          <p:cNvPr id="7" name="Arrow: Down 6">
+            <a:extLst>
+              <a:ext uri="{FF2B5EF4-FFF2-40B4-BE49-F238E27FC236}">
+                <a16:creationId xmlns:a16="http://schemas.microsoft.com/office/drawing/2014/main" id="{4BB0F74C-8A0A-E9C7-0F57-56B57D65ACCC}"/>
+              </a:ext>
+            </a:extLst>
+          </p:cNvPr>
+          <p:cNvSpPr/>
+          <p:nvPr/>
+        </p:nvSpPr>
+        <p:spPr>
+          <a:xfrm>
+            <a:off x="4617720" y="2962656"/>
+            <a:ext cx="173736" cy="377203"/>
+          </a:xfrm>
+          <a:prstGeom prst="downArrow">
+            <a:avLst/>
+          </a:prstGeom>
+        </p:spPr>
+        <p:style>
+          <a:lnRef idx="2">
+            <a:schemeClr val="accent1">
+              <a:shade val="50000"/>
+            </a:schemeClr>
+          </a:lnRef>
+          <a:fillRef idx="1">
+            <a:schemeClr val="accent1"/>
+          </a:fillRef>
+          <a:effectRef idx="0">
+            <a:schemeClr val="accent1"/>
+          </a:effectRef>
+          <a:fontRef idx="minor">
+            <a:schemeClr val="lt1"/>
+          </a:fontRef>
+        </p:style>
+        <p:txBody>
+          <a:bodyPr rtlCol="0" anchor="ctr"/>
+          <a:lstStyle/>
+          <a:p>
+            <a:pPr algn="ctr"/>
+            <a:endParaRPr lang="en-SG"/>
+          </a:p>
+        </p:txBody>
+      </p:sp>
+      <p:sp>
+        <p:nvSpPr>
+          <p:cNvPr id="8" name="Cross 7">
+            <a:extLst>
+              <a:ext uri="{FF2B5EF4-FFF2-40B4-BE49-F238E27FC236}">
+                <a16:creationId xmlns:a16="http://schemas.microsoft.com/office/drawing/2014/main" id="{C585EAC3-96CA-E466-E248-DC1D198444FE}"/>
+              </a:ext>
+            </a:extLst>
+          </p:cNvPr>
+          <p:cNvSpPr/>
+          <p:nvPr/>
+        </p:nvSpPr>
+        <p:spPr>
+          <a:xfrm>
+            <a:off x="4048771" y="1841892"/>
+            <a:ext cx="310896" cy="283464"/>
+          </a:xfrm>
+          <a:prstGeom prst="plus">
+            <a:avLst/>
+          </a:prstGeom>
+        </p:spPr>
+        <p:style>
+          <a:lnRef idx="2">
+            <a:schemeClr val="accent1">
+              <a:shade val="50000"/>
+            </a:schemeClr>
+          </a:lnRef>
+          <a:fillRef idx="1">
+            <a:schemeClr val="accent1"/>
+          </a:fillRef>
+          <a:effectRef idx="0">
+            <a:schemeClr val="accent1"/>
+          </a:effectRef>
+          <a:fontRef idx="minor">
+            <a:schemeClr val="lt1"/>
+          </a:fontRef>
+        </p:style>
+        <p:txBody>
+          <a:bodyPr rtlCol="0" anchor="ctr"/>
+          <a:lstStyle/>
+          <a:p>
+            <a:pPr algn="ctr"/>
+            <a:endParaRPr lang="en-SG" dirty="0"/>
+          </a:p>
+        </p:txBody>
+      </p:sp>
+      <p:sp>
+        <p:nvSpPr>
+          <p:cNvPr id="9" name="TextBox 8">
+            <a:extLst>
+              <a:ext uri="{FF2B5EF4-FFF2-40B4-BE49-F238E27FC236}">
+                <a16:creationId xmlns:a16="http://schemas.microsoft.com/office/drawing/2014/main" id="{D717BBB4-3B13-2219-8836-A7877895A38A}"/>
+              </a:ext>
+            </a:extLst>
+          </p:cNvPr>
+          <p:cNvSpPr txBox="1"/>
+          <p:nvPr/>
+        </p:nvSpPr>
+        <p:spPr>
+          <a:xfrm>
+            <a:off x="800100" y="2789207"/>
+            <a:ext cx="2647188" cy="523220"/>
+          </a:xfrm>
+          <a:prstGeom prst="rect">
+            <a:avLst/>
+          </a:prstGeom>
+          <a:noFill/>
+        </p:spPr>
+        <p:txBody>
+          <a:bodyPr wrap="square" rtlCol="0">
+            <a:spAutoFit/>
+          </a:bodyPr>
+          <a:lstStyle/>
+          <a:p>
+            <a:r>
+              <a:rPr lang="en-US" sz="1400" b="1" dirty="0"/>
+              <a:t>NCL CTI Report Analyzer System execution Command lines</a:t>
+            </a:r>
+            <a:endParaRPr lang="en-SG" sz="1400" b="1" dirty="0"/>
+          </a:p>
+        </p:txBody>
+      </p:sp>
+      <p:sp>
+        <p:nvSpPr>
+          <p:cNvPr id="33" name="TextBox 32">
+            <a:extLst>
+              <a:ext uri="{FF2B5EF4-FFF2-40B4-BE49-F238E27FC236}">
+                <a16:creationId xmlns:a16="http://schemas.microsoft.com/office/drawing/2014/main" id="{975BEEA3-2A28-143E-EB05-1AAEA9EE9EC5}"/>
+              </a:ext>
+            </a:extLst>
+          </p:cNvPr>
+          <p:cNvSpPr txBox="1"/>
+          <p:nvPr/>
+        </p:nvSpPr>
+        <p:spPr>
+          <a:xfrm>
+            <a:off x="4876630" y="2807208"/>
+            <a:ext cx="2643020" cy="523220"/>
+          </a:xfrm>
+          <a:prstGeom prst="rect">
+            <a:avLst/>
+          </a:prstGeom>
+          <a:noFill/>
+        </p:spPr>
+        <p:txBody>
+          <a:bodyPr wrap="square" rtlCol="0">
+            <a:spAutoFit/>
+          </a:bodyPr>
+          <a:lstStyle/>
+          <a:p>
+            <a:r>
+              <a:rPr lang="en-US" sz="1400" b="1" dirty="0"/>
+              <a:t>NCL CTI Report Analyzer System workflow diagram</a:t>
+            </a:r>
+            <a:endParaRPr lang="en-SG" sz="1400" b="1" dirty="0"/>
+          </a:p>
+        </p:txBody>
+      </p:sp>
+      <p:sp>
+        <p:nvSpPr>
+          <p:cNvPr id="36" name="TextBox 35">
+            <a:extLst>
+              <a:ext uri="{FF2B5EF4-FFF2-40B4-BE49-F238E27FC236}">
+                <a16:creationId xmlns:a16="http://schemas.microsoft.com/office/drawing/2014/main" id="{39F81B78-1698-30BE-0DBB-0BA7482FDF6C}"/>
+              </a:ext>
+            </a:extLst>
+          </p:cNvPr>
+          <p:cNvSpPr txBox="1"/>
+          <p:nvPr/>
+        </p:nvSpPr>
+        <p:spPr>
+          <a:xfrm>
+            <a:off x="5340823" y="3648456"/>
+            <a:ext cx="2294417" cy="523220"/>
+          </a:xfrm>
+          <a:prstGeom prst="rect">
+            <a:avLst/>
+          </a:prstGeom>
+          <a:noFill/>
+        </p:spPr>
+        <p:txBody>
+          <a:bodyPr wrap="square" rtlCol="0">
+            <a:spAutoFit/>
+          </a:bodyPr>
+          <a:lstStyle/>
+          <a:p>
+            <a:r>
+              <a:rPr lang="en-US" sz="1400" b="1" dirty="0"/>
+              <a:t>NCL CTI Report Analyzer</a:t>
+            </a:r>
+          </a:p>
+          <a:p>
+            <a:r>
+              <a:rPr lang="en-US" sz="1400" b="1" dirty="0"/>
+              <a:t>User Application/Web</a:t>
+            </a:r>
+            <a:endParaRPr lang="en-SG" sz="1400" b="1" dirty="0"/>
+          </a:p>
+        </p:txBody>
+      </p:sp>
+      <p:pic>
+        <p:nvPicPr>
+          <p:cNvPr id="39" name="Picture 4">
+            <a:extLst>
+              <a:ext uri="{FF2B5EF4-FFF2-40B4-BE49-F238E27FC236}">
+                <a16:creationId xmlns:a16="http://schemas.microsoft.com/office/drawing/2014/main" id="{4FAB0CD0-87FA-7365-B534-6D6BD71F87FA}"/>
+              </a:ext>
+            </a:extLst>
+          </p:cNvPr>
+          <p:cNvPicPr>
+            <a:picLocks noChangeAspect="1" noChangeArrowheads="1"/>
+          </p:cNvPicPr>
+          <p:nvPr/>
+        </p:nvPicPr>
+        <p:blipFill>
+          <a:blip r:embed="rId6">
+            <a:extLst>
+              <a:ext uri="{28A0092B-C50C-407E-A947-70E740481C1C}">
+                <a14:useLocalDpi xmlns:a14="http://schemas.microsoft.com/office/drawing/2010/main" val="0"/>
+              </a:ext>
+            </a:extLst>
+          </a:blip>
+          <a:srcRect/>
+          <a:stretch>
+            <a:fillRect/>
+          </a:stretch>
+        </p:blipFill>
+        <p:spPr bwMode="auto">
+          <a:xfrm>
+            <a:off x="6351945" y="4719110"/>
+            <a:ext cx="622998" cy="622998"/>
+          </a:xfrm>
+          <a:prstGeom prst="rect">
+            <a:avLst/>
+          </a:prstGeom>
+          <a:noFill/>
+          <a:extLst>
+            <a:ext uri="{909E8E84-426E-40DD-AFC4-6F175D3DCCD1}">
+              <a14:hiddenFill xmlns:a14="http://schemas.microsoft.com/office/drawing/2010/main">
+                <a:solidFill>
+                  <a:srgbClr val="FFFFFF"/>
+                </a:solidFill>
+              </a14:hiddenFill>
+            </a:ext>
+          </a:extLst>
+        </p:spPr>
+      </p:pic>
+      <p:sp>
+        <p:nvSpPr>
+          <p:cNvPr id="40" name="TextBox 39">
+            <a:extLst>
+              <a:ext uri="{FF2B5EF4-FFF2-40B4-BE49-F238E27FC236}">
+                <a16:creationId xmlns:a16="http://schemas.microsoft.com/office/drawing/2014/main" id="{2C5D8076-E5CE-AE46-AD02-F6032052E047}"/>
+              </a:ext>
+            </a:extLst>
+          </p:cNvPr>
+          <p:cNvSpPr txBox="1"/>
+          <p:nvPr/>
+        </p:nvSpPr>
+        <p:spPr>
+          <a:xfrm>
+            <a:off x="6095999" y="5352360"/>
+            <a:ext cx="2294417" cy="307777"/>
+          </a:xfrm>
+          <a:prstGeom prst="rect">
+            <a:avLst/>
+          </a:prstGeom>
+          <a:noFill/>
+        </p:spPr>
+        <p:txBody>
+          <a:bodyPr wrap="square" rtlCol="0">
+            <a:spAutoFit/>
+          </a:bodyPr>
+          <a:lstStyle/>
+          <a:p>
+            <a:r>
+              <a:rPr lang="en-US" sz="1400" b="1" dirty="0"/>
+              <a:t>NCL Customer</a:t>
+            </a:r>
+            <a:endParaRPr lang="en-SG" sz="1400" b="1" dirty="0"/>
+          </a:p>
+        </p:txBody>
+      </p:sp>
+      <p:cxnSp>
+        <p:nvCxnSpPr>
+          <p:cNvPr id="12" name="Straight Arrow Connector 11">
+            <a:extLst>
+              <a:ext uri="{FF2B5EF4-FFF2-40B4-BE49-F238E27FC236}">
+                <a16:creationId xmlns:a16="http://schemas.microsoft.com/office/drawing/2014/main" id="{94019760-8E2E-4185-58CF-018556923C69}"/>
+              </a:ext>
+            </a:extLst>
+          </p:cNvPr>
+          <p:cNvCxnSpPr>
+            <a:stCxn id="39" idx="1"/>
+          </p:cNvCxnSpPr>
+          <p:nvPr/>
+        </p:nvCxnSpPr>
+        <p:spPr>
+          <a:xfrm flipH="1">
+            <a:off x="5449824" y="5030609"/>
+            <a:ext cx="902121" cy="0"/>
+          </a:xfrm>
+          <a:prstGeom prst="straightConnector1">
+            <a:avLst/>
+          </a:prstGeom>
+          <a:ln w="28575">
+            <a:tailEnd type="triangle"/>
+          </a:ln>
+        </p:spPr>
+        <p:style>
+          <a:lnRef idx="1">
+            <a:schemeClr val="accent1"/>
+          </a:lnRef>
+          <a:fillRef idx="0">
+            <a:schemeClr val="accent1"/>
+          </a:fillRef>
+          <a:effectRef idx="0">
+            <a:schemeClr val="accent1"/>
+          </a:effectRef>
+          <a:fontRef idx="minor">
+            <a:schemeClr val="tx1"/>
+          </a:fontRef>
+        </p:style>
+      </p:cxnSp>
+    </p:spTree>
+    <p:extLst>
+      <p:ext uri="{BB962C8B-B14F-4D97-AF65-F5344CB8AC3E}">
+        <p14:creationId xmlns:p14="http://schemas.microsoft.com/office/powerpoint/2010/main" val="806870784"/>
+      </p:ext>
+    </p:extLst>
+  </p:cSld>
+  <p:clrMapOvr>
+    <a:masterClrMapping/>
+  </p:clrMapOvr>
+</p:sld>
+</file>
+
+<file path=ppt/slides/slide3.xml><?xml version="1.0" encoding="utf-8"?>
+<p:sld xmlns:a="http://schemas.openxmlformats.org/drawingml/2006/main" xmlns:r="http://schemas.openxmlformats.org/officeDocument/2006/relationships" xmlns:p="http://schemas.openxmlformats.org/presentationml/2006/main">
+  <p:cSld>
+    <p:spTree>
+      <p:nvGrpSpPr>
+        <p:cNvPr id="1" name=""/>
+        <p:cNvGrpSpPr/>
+        <p:nvPr/>
+      </p:nvGrpSpPr>
+      <p:grpSpPr>
+        <a:xfrm>
+          <a:off x="0" y="0"/>
+          <a:ext cx="0" cy="0"/>
+          <a:chOff x="0" y="0"/>
+          <a:chExt cx="0" cy="0"/>
+        </a:xfrm>
+      </p:grpSpPr>
+      <p:sp>
+        <p:nvSpPr>
+          <p:cNvPr id="59" name="TextBox 58">
+            <a:extLst>
+              <a:ext uri="{FF2B5EF4-FFF2-40B4-BE49-F238E27FC236}">
+                <a16:creationId xmlns:a16="http://schemas.microsoft.com/office/drawing/2014/main" id="{35C9B117-4FFB-420F-9C22-D00BABF96F6B}"/>
+              </a:ext>
+            </a:extLst>
+          </p:cNvPr>
+          <p:cNvSpPr txBox="1"/>
+          <p:nvPr/>
+        </p:nvSpPr>
+        <p:spPr>
+          <a:xfrm>
+            <a:off x="0" y="-12557"/>
+            <a:ext cx="12191999" cy="461665"/>
+          </a:xfrm>
+          <a:prstGeom prst="rect">
+            <a:avLst/>
+          </a:prstGeom>
+          <a:solidFill>
+            <a:schemeClr val="accent1">
+              <a:lumMod val="75000"/>
+            </a:schemeClr>
+          </a:solidFill>
+          <a:ln>
+            <a:solidFill>
+              <a:schemeClr val="tx1"/>
+            </a:solidFill>
+          </a:ln>
+        </p:spPr>
+        <p:txBody>
+          <a:bodyPr wrap="square" rtlCol="0">
+            <a:spAutoFit/>
+          </a:bodyPr>
+          <a:lstStyle/>
+          <a:p>
+            <a:r>
+              <a:rPr lang="en-SG" sz="2400" dirty="0">
+                <a:solidFill>
+                  <a:schemeClr val="bg1"/>
+                </a:solidFill>
+              </a:rPr>
+              <a:t>Analyzer UI design [action layer above the animation layer] </a:t>
+            </a:r>
+          </a:p>
+        </p:txBody>
+      </p:sp>
+      <p:pic>
+        <p:nvPicPr>
+          <p:cNvPr id="60" name="Picture 2" descr="National Cybersecurity R&amp;D Laboratories">
+            <a:extLst>
+              <a:ext uri="{FF2B5EF4-FFF2-40B4-BE49-F238E27FC236}">
+                <a16:creationId xmlns:a16="http://schemas.microsoft.com/office/drawing/2014/main" id="{C0C01690-426C-4610-8272-41D578335999}"/>
+              </a:ext>
+            </a:extLst>
+          </p:cNvPr>
+          <p:cNvPicPr>
+            <a:picLocks noChangeAspect="1" noChangeArrowheads="1"/>
+          </p:cNvPicPr>
+          <p:nvPr/>
+        </p:nvPicPr>
+        <p:blipFill>
+          <a:blip r:embed="rId2">
+            <a:extLst>
+              <a:ext uri="{28A0092B-C50C-407E-A947-70E740481C1C}">
+                <a14:useLocalDpi xmlns:a14="http://schemas.microsoft.com/office/drawing/2010/main" val="0"/>
+              </a:ext>
+            </a:extLst>
+          </a:blip>
+          <a:srcRect/>
+          <a:stretch>
+            <a:fillRect/>
+          </a:stretch>
+        </p:blipFill>
+        <p:spPr bwMode="auto">
+          <a:xfrm>
+            <a:off x="11547974" y="49016"/>
+            <a:ext cx="574358" cy="353452"/>
+          </a:xfrm>
+          <a:prstGeom prst="rect">
+            <a:avLst/>
+          </a:prstGeom>
+          <a:noFill/>
+          <a:ln w="12700">
+            <a:solidFill>
+              <a:schemeClr val="tx1"/>
+            </a:solidFill>
+          </a:ln>
+          <a:extLst>
+            <a:ext uri="{909E8E84-426E-40DD-AFC4-6F175D3DCCD1}">
+              <a14:hiddenFill xmlns:a14="http://schemas.microsoft.com/office/drawing/2010/main">
+                <a:solidFill>
+                  <a:srgbClr val="FFFFFF"/>
+                </a:solidFill>
+              </a14:hiddenFill>
+            </a:ext>
+          </a:extLst>
+        </p:spPr>
+      </p:pic>
+      <p:pic>
+        <p:nvPicPr>
           <p:cNvPr id="4" name="Picture 3">
             <a:extLst>
               <a:ext uri="{FF2B5EF4-FFF2-40B4-BE49-F238E27FC236}">
@@ -5528,7 +7383,7 @@
 </p:sld>
 </file>
 
-<file path=ppt/slides/slide3.xml><?xml version="1.0" encoding="utf-8"?>
+<file path=ppt/slides/slide4.xml><?xml version="1.0" encoding="utf-8"?>
 <p:sld xmlns:a="http://schemas.openxmlformats.org/drawingml/2006/main" xmlns:r="http://schemas.openxmlformats.org/officeDocument/2006/relationships" xmlns:p="http://schemas.openxmlformats.org/presentationml/2006/main">
   <p:cSld>
     <p:spTree>
@@ -7020,4 +8875,299 @@
     </a:ext>
   </a:extLst>
 </a:theme>
+</file>
+
+<file path=ppt/theme/theme2.xml><?xml version="1.0" encoding="utf-8"?>
+<a:theme xmlns:a="http://schemas.openxmlformats.org/drawingml/2006/main" name="Office Theme">
+  <a:themeElements>
+    <a:clrScheme name="Office">
+      <a:dk1>
+        <a:sysClr val="windowText" lastClr="000000"/>
+      </a:dk1>
+      <a:lt1>
+        <a:sysClr val="window" lastClr="FFFFFF"/>
+      </a:lt1>
+      <a:dk2>
+        <a:srgbClr val="44546A"/>
+      </a:dk2>
+      <a:lt2>
+        <a:srgbClr val="E7E6E6"/>
+      </a:lt2>
+      <a:accent1>
+        <a:srgbClr val="4472C4"/>
+      </a:accent1>
+      <a:accent2>
+        <a:srgbClr val="ED7D31"/>
+      </a:accent2>
+      <a:accent3>
+        <a:srgbClr val="A5A5A5"/>
+      </a:accent3>
+      <a:accent4>
+        <a:srgbClr val="FFC000"/>
+      </a:accent4>
+      <a:accent5>
+        <a:srgbClr val="5B9BD5"/>
+      </a:accent5>
+      <a:accent6>
+        <a:srgbClr val="70AD47"/>
+      </a:accent6>
+      <a:hlink>
+        <a:srgbClr val="0563C1"/>
+      </a:hlink>
+      <a:folHlink>
+        <a:srgbClr val="954F72"/>
+      </a:folHlink>
+    </a:clrScheme>
+    <a:fontScheme name="Office">
+      <a:majorFont>
+        <a:latin typeface="Calibri Light" panose="020F0302020204030204"/>
+        <a:ea typeface=""/>
+        <a:cs typeface=""/>
+        <a:font script="Jpan" typeface="游ゴシック Light"/>
+        <a:font script="Hang" typeface="맑은 고딕"/>
+        <a:font script="Hans" typeface="等线 Light"/>
+        <a:font script="Hant" typeface="新細明體"/>
+        <a:font script="Arab" typeface="Times New Roman"/>
+        <a:font script="Hebr" typeface="Times New Roman"/>
+        <a:font script="Thai" typeface="Angsana New"/>
+        <a:font script="Ethi" typeface="Nyala"/>
+        <a:font script="Beng" typeface="Vrinda"/>
+        <a:font script="Gujr" typeface="Shruti"/>
+        <a:font script="Khmr" typeface="MoolBoran"/>
+        <a:font script="Knda" typeface="Tunga"/>
+        <a:font script="Guru" typeface="Raavi"/>
+        <a:font script="Cans" typeface="Euphemia"/>
+        <a:font script="Cher" typeface="Plantagenet Cherokee"/>
+        <a:font script="Yiii" typeface="Microsoft Yi Baiti"/>
+        <a:font script="Tibt" typeface="Microsoft Himalaya"/>
+        <a:font script="Thaa" typeface="MV Boli"/>
+        <a:font script="Deva" typeface="Mangal"/>
+        <a:font script="Telu" typeface="Gautami"/>
+        <a:font script="Taml" typeface="Latha"/>
+        <a:font script="Syrc" typeface="Estrangelo Edessa"/>
+        <a:font script="Orya" typeface="Kalinga"/>
+        <a:font script="Mlym" typeface="Kartika"/>
+        <a:font script="Laoo" typeface="DokChampa"/>
+        <a:font script="Sinh" typeface="Iskoola Pota"/>
+        <a:font script="Mong" typeface="Mongolian Baiti"/>
+        <a:font script="Viet" typeface="Times New Roman"/>
+        <a:font script="Uigh" typeface="Microsoft Uighur"/>
+        <a:font script="Geor" typeface="Sylfaen"/>
+        <a:font script="Armn" typeface="Arial"/>
+        <a:font script="Bugi" typeface="Leelawadee UI"/>
+        <a:font script="Bopo" typeface="Microsoft JhengHei"/>
+        <a:font script="Java" typeface="Javanese Text"/>
+        <a:font script="Lisu" typeface="Segoe UI"/>
+        <a:font script="Mymr" typeface="Myanmar Text"/>
+        <a:font script="Nkoo" typeface="Ebrima"/>
+        <a:font script="Olck" typeface="Nirmala UI"/>
+        <a:font script="Osma" typeface="Ebrima"/>
+        <a:font script="Phag" typeface="Phagspa"/>
+        <a:font script="Syrn" typeface="Estrangelo Edessa"/>
+        <a:font script="Syrj" typeface="Estrangelo Edessa"/>
+        <a:font script="Syre" typeface="Estrangelo Edessa"/>
+        <a:font script="Sora" typeface="Nirmala UI"/>
+        <a:font script="Tale" typeface="Microsoft Tai Le"/>
+        <a:font script="Talu" typeface="Microsoft New Tai Lue"/>
+        <a:font script="Tfng" typeface="Ebrima"/>
+      </a:majorFont>
+      <a:minorFont>
+        <a:latin typeface="Calibri" panose="020F0502020204030204"/>
+        <a:ea typeface=""/>
+        <a:cs typeface=""/>
+        <a:font script="Jpan" typeface="游ゴシック"/>
+        <a:font script="Hang" typeface="맑은 고딕"/>
+        <a:font script="Hans" typeface="等线"/>
+        <a:font script="Hant" typeface="新細明體"/>
+        <a:font script="Arab" typeface="Arial"/>
+        <a:font script="Hebr" typeface="Arial"/>
+        <a:font script="Thai" typeface="Cordia New"/>
+        <a:font script="Ethi" typeface="Nyala"/>
+        <a:font script="Beng" typeface="Vrinda"/>
+        <a:font script="Gujr" typeface="Shruti"/>
+        <a:font script="Khmr" typeface="DaunPenh"/>
+        <a:font script="Knda" typeface="Tunga"/>
+        <a:font script="Guru" typeface="Raavi"/>
+        <a:font script="Cans" typeface="Euphemia"/>
+        <a:font script="Cher" typeface="Plantagenet Cherokee"/>
+        <a:font script="Yiii" typeface="Microsoft Yi Baiti"/>
+        <a:font script="Tibt" typeface="Microsoft Himalaya"/>
+        <a:font script="Thaa" typeface="MV Boli"/>
+        <a:font script="Deva" typeface="Mangal"/>
+        <a:font script="Telu" typeface="Gautami"/>
+        <a:font script="Taml" typeface="Latha"/>
+        <a:font script="Syrc" typeface="Estrangelo Edessa"/>
+        <a:font script="Orya" typeface="Kalinga"/>
+        <a:font script="Mlym" typeface="Kartika"/>
+        <a:font script="Laoo" typeface="DokChampa"/>
+        <a:font script="Sinh" typeface="Iskoola Pota"/>
+        <a:font script="Mong" typeface="Mongolian Baiti"/>
+        <a:font script="Viet" typeface="Arial"/>
+        <a:font script="Uigh" typeface="Microsoft Uighur"/>
+        <a:font script="Geor" typeface="Sylfaen"/>
+        <a:font script="Armn" typeface="Arial"/>
+        <a:font script="Bugi" typeface="Leelawadee UI"/>
+        <a:font script="Bopo" typeface="Microsoft JhengHei"/>
+        <a:font script="Java" typeface="Javanese Text"/>
+        <a:font script="Lisu" typeface="Segoe UI"/>
+        <a:font script="Mymr" typeface="Myanmar Text"/>
+        <a:font script="Nkoo" typeface="Ebrima"/>
+        <a:font script="Olck" typeface="Nirmala UI"/>
+        <a:font script="Osma" typeface="Ebrima"/>
+        <a:font script="Phag" typeface="Phagspa"/>
+        <a:font script="Syrn" typeface="Estrangelo Edessa"/>
+        <a:font script="Syrj" typeface="Estrangelo Edessa"/>
+        <a:font script="Syre" typeface="Estrangelo Edessa"/>
+        <a:font script="Sora" typeface="Nirmala UI"/>
+        <a:font script="Tale" typeface="Microsoft Tai Le"/>
+        <a:font script="Talu" typeface="Microsoft New Tai Lue"/>
+        <a:font script="Tfng" typeface="Ebrima"/>
+      </a:minorFont>
+    </a:fontScheme>
+    <a:fmtScheme name="Office">
+      <a:fillStyleLst>
+        <a:solidFill>
+          <a:schemeClr val="phClr"/>
+        </a:solidFill>
+        <a:gradFill rotWithShape="1">
+          <a:gsLst>
+            <a:gs pos="0">
+              <a:schemeClr val="phClr">
+                <a:lumMod val="110000"/>
+                <a:satMod val="105000"/>
+                <a:tint val="67000"/>
+              </a:schemeClr>
+            </a:gs>
+            <a:gs pos="50000">
+              <a:schemeClr val="phClr">
+                <a:lumMod val="105000"/>
+                <a:satMod val="103000"/>
+                <a:tint val="73000"/>
+              </a:schemeClr>
+            </a:gs>
+            <a:gs pos="100000">
+              <a:schemeClr val="phClr">
+                <a:lumMod val="105000"/>
+                <a:satMod val="109000"/>
+                <a:tint val="81000"/>
+              </a:schemeClr>
+            </a:gs>
+          </a:gsLst>
+          <a:lin ang="5400000" scaled="0"/>
+        </a:gradFill>
+        <a:gradFill rotWithShape="1">
+          <a:gsLst>
+            <a:gs pos="0">
+              <a:schemeClr val="phClr">
+                <a:satMod val="103000"/>
+                <a:lumMod val="102000"/>
+                <a:tint val="94000"/>
+              </a:schemeClr>
+            </a:gs>
+            <a:gs pos="50000">
+              <a:schemeClr val="phClr">
+                <a:satMod val="110000"/>
+                <a:lumMod val="100000"/>
+                <a:shade val="100000"/>
+              </a:schemeClr>
+            </a:gs>
+            <a:gs pos="100000">
+              <a:schemeClr val="phClr">
+                <a:lumMod val="99000"/>
+                <a:satMod val="120000"/>
+                <a:shade val="78000"/>
+              </a:schemeClr>
+            </a:gs>
+          </a:gsLst>
+          <a:lin ang="5400000" scaled="0"/>
+        </a:gradFill>
+      </a:fillStyleLst>
+      <a:lnStyleLst>
+        <a:ln w="6350" cap="flat" cmpd="sng" algn="ctr">
+          <a:solidFill>
+            <a:schemeClr val="phClr"/>
+          </a:solidFill>
+          <a:prstDash val="solid"/>
+          <a:miter lim="800000"/>
+        </a:ln>
+        <a:ln w="12700" cap="flat" cmpd="sng" algn="ctr">
+          <a:solidFill>
+            <a:schemeClr val="phClr"/>
+          </a:solidFill>
+          <a:prstDash val="solid"/>
+          <a:miter lim="800000"/>
+        </a:ln>
+        <a:ln w="19050" cap="flat" cmpd="sng" algn="ctr">
+          <a:solidFill>
+            <a:schemeClr val="phClr"/>
+          </a:solidFill>
+          <a:prstDash val="solid"/>
+          <a:miter lim="800000"/>
+        </a:ln>
+      </a:lnStyleLst>
+      <a:effectStyleLst>
+        <a:effectStyle>
+          <a:effectLst/>
+        </a:effectStyle>
+        <a:effectStyle>
+          <a:effectLst/>
+        </a:effectStyle>
+        <a:effectStyle>
+          <a:effectLst>
+            <a:outerShdw blurRad="57150" dist="19050" dir="5400000" algn="ctr" rotWithShape="0">
+              <a:srgbClr val="000000">
+                <a:alpha val="63000"/>
+              </a:srgbClr>
+            </a:outerShdw>
+          </a:effectLst>
+        </a:effectStyle>
+      </a:effectStyleLst>
+      <a:bgFillStyleLst>
+        <a:solidFill>
+          <a:schemeClr val="phClr"/>
+        </a:solidFill>
+        <a:solidFill>
+          <a:schemeClr val="phClr">
+            <a:tint val="95000"/>
+            <a:satMod val="170000"/>
+          </a:schemeClr>
+        </a:solidFill>
+        <a:gradFill rotWithShape="1">
+          <a:gsLst>
+            <a:gs pos="0">
+              <a:schemeClr val="phClr">
+                <a:tint val="93000"/>
+                <a:satMod val="150000"/>
+                <a:shade val="98000"/>
+                <a:lumMod val="102000"/>
+              </a:schemeClr>
+            </a:gs>
+            <a:gs pos="50000">
+              <a:schemeClr val="phClr">
+                <a:tint val="98000"/>
+                <a:satMod val="130000"/>
+                <a:shade val="90000"/>
+                <a:lumMod val="103000"/>
+              </a:schemeClr>
+            </a:gs>
+            <a:gs pos="100000">
+              <a:schemeClr val="phClr">
+                <a:shade val="63000"/>
+                <a:satMod val="120000"/>
+              </a:schemeClr>
+            </a:gs>
+          </a:gsLst>
+          <a:lin ang="5400000" scaled="0"/>
+        </a:gradFill>
+      </a:bgFillStyleLst>
+    </a:fmtScheme>
+  </a:themeElements>
+  <a:objectDefaults/>
+  <a:extraClrSchemeLst/>
+  <a:extLst>
+    <a:ext uri="{05A4C25C-085E-4340-85A3-A5531E510DB2}">
+      <thm15:themeFamily xmlns:thm15="http://schemas.microsoft.com/office/thememl/2012/main" name="Office Theme" id="{62F939B6-93AF-4DB8-9C6B-D6C7DFDC589F}" vid="{4A3C46E8-61CC-4603-A589-7422A47A8E4A}"/>
+    </a:ext>
+  </a:extLst>
+</a:theme>
 </file>
</xml_diff>